<commit_message>
presentation video was added
</commit_message>
<xml_diff>
--- a/Obstacle Avoiding Robot.pptx
+++ b/Obstacle Avoiding Robot.pptx
@@ -6,14 +6,15 @@
   </p:sldMasterIdLst>
   <p:sldIdLst>
     <p:sldId id="256" r:id="rId2"/>
-    <p:sldId id="257" r:id="rId3"/>
-    <p:sldId id="258" r:id="rId4"/>
-    <p:sldId id="259" r:id="rId5"/>
-    <p:sldId id="260" r:id="rId6"/>
-    <p:sldId id="261" r:id="rId7"/>
-    <p:sldId id="264" r:id="rId8"/>
-    <p:sldId id="262" r:id="rId9"/>
-    <p:sldId id="263" r:id="rId10"/>
+    <p:sldId id="265" r:id="rId3"/>
+    <p:sldId id="257" r:id="rId4"/>
+    <p:sldId id="258" r:id="rId5"/>
+    <p:sldId id="259" r:id="rId6"/>
+    <p:sldId id="260" r:id="rId7"/>
+    <p:sldId id="261" r:id="rId8"/>
+    <p:sldId id="264" r:id="rId9"/>
+    <p:sldId id="262" r:id="rId10"/>
+    <p:sldId id="263" r:id="rId11"/>
   </p:sldIdLst>
   <p:sldSz cx="12192000" cy="6858000"/>
   <p:notesSz cx="6858000" cy="9144000"/>
@@ -4402,7 +4403,7 @@
           <a:p>
             <a:fld id="{48A87A34-81AB-432B-8DAE-1953F412C126}" type="datetimeFigureOut">
               <a:rPr lang="en-US" dirty="0"/>
-              <a:t>3/30/2022</a:t>
+              <a:t>4/2/2022</a:t>
             </a:fld>
             <a:endParaRPr lang="en-US" dirty="0"/>
           </a:p>
@@ -4664,7 +4665,7 @@
           <a:p>
             <a:fld id="{48A87A34-81AB-432B-8DAE-1953F412C126}" type="datetimeFigureOut">
               <a:rPr lang="en-US" dirty="0"/>
-              <a:t>3/30/2022</a:t>
+              <a:t>4/2/2022</a:t>
             </a:fld>
             <a:endParaRPr lang="en-US" dirty="0"/>
           </a:p>
@@ -4855,7 +4856,7 @@
           <a:p>
             <a:fld id="{48A87A34-81AB-432B-8DAE-1953F412C126}" type="datetimeFigureOut">
               <a:rPr lang="en-US" dirty="0"/>
-              <a:t>3/30/2022</a:t>
+              <a:t>4/2/2022</a:t>
             </a:fld>
             <a:endParaRPr lang="en-US" dirty="0"/>
           </a:p>
@@ -5113,7 +5114,7 @@
           <a:p>
             <a:fld id="{48A87A34-81AB-432B-8DAE-1953F412C126}" type="datetimeFigureOut">
               <a:rPr lang="en-US" dirty="0"/>
-              <a:t>3/30/2022</a:t>
+              <a:t>4/2/2022</a:t>
             </a:fld>
             <a:endParaRPr lang="en-US" dirty="0"/>
           </a:p>
@@ -5542,7 +5543,7 @@
           <a:p>
             <a:fld id="{48A87A34-81AB-432B-8DAE-1953F412C126}" type="datetimeFigureOut">
               <a:rPr lang="en-US" dirty="0"/>
-              <a:t>3/30/2022</a:t>
+              <a:t>4/2/2022</a:t>
             </a:fld>
             <a:endParaRPr lang="en-US" dirty="0"/>
           </a:p>
@@ -6083,7 +6084,7 @@
           <a:p>
             <a:fld id="{48A87A34-81AB-432B-8DAE-1953F412C126}" type="datetimeFigureOut">
               <a:rPr lang="en-US" dirty="0"/>
-              <a:t>3/30/2022</a:t>
+              <a:t>4/2/2022</a:t>
             </a:fld>
             <a:endParaRPr lang="en-US" dirty="0"/>
           </a:p>
@@ -6798,7 +6799,7 @@
           <a:p>
             <a:fld id="{48A87A34-81AB-432B-8DAE-1953F412C126}" type="datetimeFigureOut">
               <a:rPr lang="en-US" dirty="0"/>
-              <a:t>3/30/2022</a:t>
+              <a:t>4/2/2022</a:t>
             </a:fld>
             <a:endParaRPr lang="en-US" dirty="0"/>
           </a:p>
@@ -6963,7 +6964,7 @@
           <a:p>
             <a:fld id="{48A87A34-81AB-432B-8DAE-1953F412C126}" type="datetimeFigureOut">
               <a:rPr lang="en-US" dirty="0"/>
-              <a:t>3/30/2022</a:t>
+              <a:t>4/2/2022</a:t>
             </a:fld>
             <a:endParaRPr lang="en-US" dirty="0"/>
           </a:p>
@@ -7138,7 +7139,7 @@
           <a:p>
             <a:fld id="{48A87A34-81AB-432B-8DAE-1953F412C126}" type="datetimeFigureOut">
               <a:rPr lang="en-US" dirty="0"/>
-              <a:t>3/30/2022</a:t>
+              <a:t>4/2/2022</a:t>
             </a:fld>
             <a:endParaRPr lang="en-US" dirty="0"/>
           </a:p>
@@ -7303,7 +7304,7 @@
           <a:p>
             <a:fld id="{48A87A34-81AB-432B-8DAE-1953F412C126}" type="datetimeFigureOut">
               <a:rPr lang="en-US" dirty="0"/>
-              <a:t>3/30/2022</a:t>
+              <a:t>4/2/2022</a:t>
             </a:fld>
             <a:endParaRPr lang="en-US" dirty="0"/>
           </a:p>
@@ -7548,7 +7549,7 @@
           <a:p>
             <a:fld id="{48A87A34-81AB-432B-8DAE-1953F412C126}" type="datetimeFigureOut">
               <a:rPr lang="en-US" dirty="0"/>
-              <a:t>3/30/2022</a:t>
+              <a:t>4/2/2022</a:t>
             </a:fld>
             <a:endParaRPr lang="en-US" dirty="0"/>
           </a:p>
@@ -7775,7 +7776,7 @@
           <a:p>
             <a:fld id="{48A87A34-81AB-432B-8DAE-1953F412C126}" type="datetimeFigureOut">
               <a:rPr lang="en-US" dirty="0"/>
-              <a:t>3/30/2022</a:t>
+              <a:t>4/2/2022</a:t>
             </a:fld>
             <a:endParaRPr lang="en-US" dirty="0"/>
           </a:p>
@@ -8151,7 +8152,7 @@
           <a:p>
             <a:fld id="{48A87A34-81AB-432B-8DAE-1953F412C126}" type="datetimeFigureOut">
               <a:rPr lang="en-US" dirty="0"/>
-              <a:t>3/30/2022</a:t>
+              <a:t>4/2/2022</a:t>
             </a:fld>
             <a:endParaRPr lang="en-US" dirty="0"/>
           </a:p>
@@ -8264,7 +8265,7 @@
           <a:p>
             <a:fld id="{48A87A34-81AB-432B-8DAE-1953F412C126}" type="datetimeFigureOut">
               <a:rPr lang="en-US" dirty="0"/>
-              <a:t>3/30/2022</a:t>
+              <a:t>4/2/2022</a:t>
             </a:fld>
             <a:endParaRPr lang="en-US" dirty="0"/>
           </a:p>
@@ -8354,7 +8355,7 @@
           <a:p>
             <a:fld id="{48A87A34-81AB-432B-8DAE-1953F412C126}" type="datetimeFigureOut">
               <a:rPr lang="en-US" dirty="0"/>
-              <a:t>3/30/2022</a:t>
+              <a:t>4/2/2022</a:t>
             </a:fld>
             <a:endParaRPr lang="en-US" dirty="0"/>
           </a:p>
@@ -8598,7 +8599,7 @@
           <a:p>
             <a:fld id="{48A87A34-81AB-432B-8DAE-1953F412C126}" type="datetimeFigureOut">
               <a:rPr lang="en-US" dirty="0"/>
-              <a:t>3/30/2022</a:t>
+              <a:t>4/2/2022</a:t>
             </a:fld>
             <a:endParaRPr lang="en-US" dirty="0"/>
           </a:p>
@@ -8873,7 +8874,7 @@
           <a:p>
             <a:fld id="{48A87A34-81AB-432B-8DAE-1953F412C126}" type="datetimeFigureOut">
               <a:rPr lang="en-US" dirty="0"/>
-              <a:t>3/30/2022</a:t>
+              <a:t>4/2/2022</a:t>
             </a:fld>
             <a:endParaRPr lang="en-US" dirty="0"/>
           </a:p>
@@ -11936,7 +11937,7 @@
             <a:fld id="{48A87A34-81AB-432B-8DAE-1953F412C126}" type="datetimeFigureOut">
               <a:rPr lang="en-US" dirty="0"/>
               <a:pPr/>
-              <a:t>3/30/2022</a:t>
+              <a:t>4/2/2022</a:t>
             </a:fld>
             <a:endParaRPr lang="en-US" dirty="0"/>
           </a:p>
@@ -12413,8 +12414,8 @@
         </p:nvSpPr>
         <p:spPr>
           <a:xfrm>
-            <a:off x="2571749" y="4891089"/>
-            <a:ext cx="8791575" cy="1655762"/>
+            <a:off x="7324725" y="4891089"/>
+            <a:ext cx="4038599" cy="1655762"/>
           </a:xfrm>
         </p:spPr>
         <p:txBody>
@@ -12435,6 +12436,58 @@
               </a:rPr>
               <a:t>4nm19me025@nmamit.in</a:t>
             </a:r>
+          </a:p>
+        </p:txBody>
+      </p:sp>
+      <p:sp>
+        <p:nvSpPr>
+          <p:cNvPr id="4" name="Rectangle 3">
+            <a:extLst>
+              <a:ext uri="{FF2B5EF4-FFF2-40B4-BE49-F238E27FC236}">
+                <a16:creationId xmlns:a16="http://schemas.microsoft.com/office/drawing/2014/main" id="{D5418A77-E9E6-4E8F-8157-DE09CDC75278}"/>
+              </a:ext>
+            </a:extLst>
+          </p:cNvPr>
+          <p:cNvSpPr/>
+          <p:nvPr/>
+        </p:nvSpPr>
+        <p:spPr>
+          <a:xfrm>
+            <a:off x="2009775" y="5488137"/>
+            <a:ext cx="2743200" cy="461665"/>
+          </a:xfrm>
+          <a:prstGeom prst="rect">
+            <a:avLst/>
+          </a:prstGeom>
+        </p:spPr>
+        <p:txBody>
+          <a:bodyPr wrap="square">
+            <a:spAutoFit/>
+          </a:bodyPr>
+          <a:lstStyle/>
+          <a:p>
+            <a:r>
+              <a:rPr lang="en-IN" sz="2400" dirty="0">
+                <a:solidFill>
+                  <a:schemeClr val="accent5">
+                    <a:lumMod val="75000"/>
+                  </a:schemeClr>
+                </a:solidFill>
+                <a:latin typeface="+mj-lt"/>
+                <a:cs typeface="Times New Roman" panose="02020603050405020304" pitchFamily="18" charset="0"/>
+                <a:hlinkClick r:id="rId2" tooltip="Link to project"/>
+              </a:rPr>
+              <a:t>Link to project</a:t>
+            </a:r>
+            <a:endParaRPr lang="en-IN" sz="2400" dirty="0">
+              <a:solidFill>
+                <a:schemeClr val="accent5">
+                  <a:lumMod val="75000"/>
+                </a:schemeClr>
+              </a:solidFill>
+              <a:latin typeface="+mj-lt"/>
+              <a:cs typeface="Times New Roman" panose="02020603050405020304" pitchFamily="18" charset="0"/>
+            </a:endParaRPr>
           </a:p>
         </p:txBody>
       </p:sp>
@@ -12451,1004 +12504,7 @@
 </p:sld>
 </file>
 
-<file path=ppt/slides/slide2.xml><?xml version="1.0" encoding="utf-8"?>
-<p:sld xmlns:a="http://schemas.openxmlformats.org/drawingml/2006/main" xmlns:r="http://schemas.openxmlformats.org/officeDocument/2006/relationships" xmlns:p="http://schemas.openxmlformats.org/presentationml/2006/main">
-  <p:cSld>
-    <p:spTree>
-      <p:nvGrpSpPr>
-        <p:cNvPr id="1" name=""/>
-        <p:cNvGrpSpPr/>
-        <p:nvPr/>
-      </p:nvGrpSpPr>
-      <p:grpSpPr>
-        <a:xfrm>
-          <a:off x="0" y="0"/>
-          <a:ext cx="0" cy="0"/>
-          <a:chOff x="0" y="0"/>
-          <a:chExt cx="0" cy="0"/>
-        </a:xfrm>
-      </p:grpSpPr>
-      <p:sp>
-        <p:nvSpPr>
-          <p:cNvPr id="2" name="Title 1">
-            <a:extLst>
-              <a:ext uri="{FF2B5EF4-FFF2-40B4-BE49-F238E27FC236}">
-                <a16:creationId xmlns:a16="http://schemas.microsoft.com/office/drawing/2014/main" id="{53078717-AA87-4984-99E2-41502A7593E3}"/>
-              </a:ext>
-            </a:extLst>
-          </p:cNvPr>
-          <p:cNvSpPr>
-            <a:spLocks noGrp="1"/>
-          </p:cNvSpPr>
-          <p:nvPr>
-            <p:ph type="title"/>
-          </p:nvPr>
-        </p:nvSpPr>
-        <p:spPr/>
-        <p:txBody>
-          <a:bodyPr>
-            <a:normAutofit/>
-          </a:bodyPr>
-          <a:lstStyle/>
-          <a:p>
-            <a:r>
-              <a:rPr lang="en-IN" sz="2800" dirty="0">
-                <a:latin typeface="Artifakt Element Book" panose="020B0503050000020004" pitchFamily="34" charset="0"/>
-                <a:ea typeface="Artifakt Element Book" panose="020B0503050000020004" pitchFamily="34" charset="0"/>
-                <a:cs typeface="Adobe Arabic" panose="02040503050201020203" pitchFamily="18" charset="-78"/>
-              </a:rPr>
-              <a:t>Components Involved</a:t>
-            </a:r>
-          </a:p>
-        </p:txBody>
-      </p:sp>
-      <p:pic>
-        <p:nvPicPr>
-          <p:cNvPr id="5" name="Picture 4">
-            <a:extLst>
-              <a:ext uri="{FF2B5EF4-FFF2-40B4-BE49-F238E27FC236}">
-                <a16:creationId xmlns:a16="http://schemas.microsoft.com/office/drawing/2014/main" id="{4DD5DBB5-515C-452F-B05D-12CE51D7E413}"/>
-              </a:ext>
-            </a:extLst>
-          </p:cNvPr>
-          <p:cNvPicPr>
-            <a:picLocks noChangeAspect="1"/>
-          </p:cNvPicPr>
-          <p:nvPr/>
-        </p:nvPicPr>
-        <p:blipFill>
-          <a:blip r:embed="rId2"/>
-          <a:stretch>
-            <a:fillRect/>
-          </a:stretch>
-        </p:blipFill>
-        <p:spPr>
-          <a:xfrm>
-            <a:off x="1141413" y="2117725"/>
-            <a:ext cx="8056749" cy="3835399"/>
-          </a:xfrm>
-          <a:prstGeom prst="rect">
-            <a:avLst/>
-          </a:prstGeom>
-        </p:spPr>
-      </p:pic>
-    </p:spTree>
-    <p:extLst>
-      <p:ext uri="{BB962C8B-B14F-4D97-AF65-F5344CB8AC3E}">
-        <p14:creationId xmlns:p14="http://schemas.microsoft.com/office/powerpoint/2010/main" val="962327110"/>
-      </p:ext>
-    </p:extLst>
-  </p:cSld>
-  <p:clrMapOvr>
-    <a:masterClrMapping/>
-  </p:clrMapOvr>
-</p:sld>
-</file>
-
-<file path=ppt/slides/slide3.xml><?xml version="1.0" encoding="utf-8"?>
-<p:sld xmlns:a="http://schemas.openxmlformats.org/drawingml/2006/main" xmlns:r="http://schemas.openxmlformats.org/officeDocument/2006/relationships" xmlns:p="http://schemas.openxmlformats.org/presentationml/2006/main">
-  <p:cSld>
-    <p:spTree>
-      <p:nvGrpSpPr>
-        <p:cNvPr id="1" name=""/>
-        <p:cNvGrpSpPr/>
-        <p:nvPr/>
-      </p:nvGrpSpPr>
-      <p:grpSpPr>
-        <a:xfrm>
-          <a:off x="0" y="0"/>
-          <a:ext cx="0" cy="0"/>
-          <a:chOff x="0" y="0"/>
-          <a:chExt cx="0" cy="0"/>
-        </a:xfrm>
-      </p:grpSpPr>
-      <p:sp>
-        <p:nvSpPr>
-          <p:cNvPr id="2" name="Title 1">
-            <a:extLst>
-              <a:ext uri="{FF2B5EF4-FFF2-40B4-BE49-F238E27FC236}">
-                <a16:creationId xmlns:a16="http://schemas.microsoft.com/office/drawing/2014/main" id="{D044869A-B0DD-4187-91DB-40A2E7E63C3D}"/>
-              </a:ext>
-            </a:extLst>
-          </p:cNvPr>
-          <p:cNvSpPr>
-            <a:spLocks noGrp="1"/>
-          </p:cNvSpPr>
-          <p:nvPr>
-            <p:ph type="title"/>
-          </p:nvPr>
-        </p:nvSpPr>
-        <p:spPr/>
-        <p:txBody>
-          <a:bodyPr/>
-          <a:lstStyle/>
-          <a:p>
-            <a:r>
-              <a:rPr lang="en-IN" dirty="0"/>
-              <a:t>Arduino</a:t>
-            </a:r>
-          </a:p>
-        </p:txBody>
-      </p:sp>
-      <p:sp>
-        <p:nvSpPr>
-          <p:cNvPr id="3" name="Content Placeholder 2">
-            <a:extLst>
-              <a:ext uri="{FF2B5EF4-FFF2-40B4-BE49-F238E27FC236}">
-                <a16:creationId xmlns:a16="http://schemas.microsoft.com/office/drawing/2014/main" id="{3369E541-EF95-465A-B0F7-862D3756C690}"/>
-              </a:ext>
-            </a:extLst>
-          </p:cNvPr>
-          <p:cNvSpPr>
-            <a:spLocks noGrp="1"/>
-          </p:cNvSpPr>
-          <p:nvPr>
-            <p:ph idx="1"/>
-          </p:nvPr>
-        </p:nvSpPr>
-        <p:spPr>
-          <a:xfrm>
-            <a:off x="971549" y="2265969"/>
-            <a:ext cx="6411912" cy="3541714"/>
-          </a:xfrm>
-        </p:spPr>
-        <p:txBody>
-          <a:bodyPr>
-            <a:normAutofit/>
-          </a:bodyPr>
-          <a:lstStyle/>
-          <a:p>
-            <a:r>
-              <a:rPr lang="en-IN" sz="1600" dirty="0">
-                <a:latin typeface="Times New Roman" panose="02020603050405020304" pitchFamily="18" charset="0"/>
-                <a:cs typeface="Times New Roman" panose="02020603050405020304" pitchFamily="18" charset="0"/>
-              </a:rPr>
-              <a:t>The microcontroller used in this project is an Arduino Uno</a:t>
-            </a:r>
-          </a:p>
-          <a:p>
-            <a:r>
-              <a:rPr lang="en-IN" sz="1600" dirty="0">
-                <a:latin typeface="Times New Roman" panose="02020603050405020304" pitchFamily="18" charset="0"/>
-                <a:cs typeface="Times New Roman" panose="02020603050405020304" pitchFamily="18" charset="0"/>
-              </a:rPr>
-              <a:t>Arduino is an opensource platform.</a:t>
-            </a:r>
-          </a:p>
-          <a:p>
-            <a:r>
-              <a:rPr lang="en-IN" sz="1600" dirty="0">
-                <a:latin typeface="Times New Roman" panose="02020603050405020304" pitchFamily="18" charset="0"/>
-                <a:cs typeface="Times New Roman" panose="02020603050405020304" pitchFamily="18" charset="0"/>
-              </a:rPr>
-              <a:t>The Arduino boards are easily programmed on the Arduino Software (IDE). Arduino Uno is based on the microcontroller ATmega328P which has a flash memory of 32 kB</a:t>
-            </a:r>
-          </a:p>
-          <a:p>
-            <a:r>
-              <a:rPr lang="en-IN" sz="1600" dirty="0">
-                <a:latin typeface="Times New Roman" panose="02020603050405020304" pitchFamily="18" charset="0"/>
-                <a:cs typeface="Times New Roman" panose="02020603050405020304" pitchFamily="18" charset="0"/>
-              </a:rPr>
-              <a:t> It has 14 digital input/output pins and six of these can be used as PWM outputs</a:t>
-            </a:r>
-          </a:p>
-        </p:txBody>
-      </p:sp>
-      <p:pic>
-        <p:nvPicPr>
-          <p:cNvPr id="5" name="Picture 4">
-            <a:extLst>
-              <a:ext uri="{FF2B5EF4-FFF2-40B4-BE49-F238E27FC236}">
-                <a16:creationId xmlns:a16="http://schemas.microsoft.com/office/drawing/2014/main" id="{CA862EBD-BB3F-4435-B8FF-15BF1DD515CD}"/>
-              </a:ext>
-            </a:extLst>
-          </p:cNvPr>
-          <p:cNvPicPr>
-            <a:picLocks noChangeAspect="1"/>
-          </p:cNvPicPr>
-          <p:nvPr/>
-        </p:nvPicPr>
-        <p:blipFill>
-          <a:blip r:embed="rId2"/>
-          <a:stretch>
-            <a:fillRect/>
-          </a:stretch>
-        </p:blipFill>
-        <p:spPr>
-          <a:xfrm>
-            <a:off x="7505701" y="1923069"/>
-            <a:ext cx="3457575" cy="3457575"/>
-          </a:xfrm>
-          <a:prstGeom prst="rect">
-            <a:avLst/>
-          </a:prstGeom>
-        </p:spPr>
-      </p:pic>
-    </p:spTree>
-    <p:extLst>
-      <p:ext uri="{BB962C8B-B14F-4D97-AF65-F5344CB8AC3E}">
-        <p14:creationId xmlns:p14="http://schemas.microsoft.com/office/powerpoint/2010/main" val="2012055216"/>
-      </p:ext>
-    </p:extLst>
-  </p:cSld>
-  <p:clrMapOvr>
-    <a:masterClrMapping/>
-  </p:clrMapOvr>
-</p:sld>
-</file>
-
-<file path=ppt/slides/slide4.xml><?xml version="1.0" encoding="utf-8"?>
-<p:sld xmlns:a="http://schemas.openxmlformats.org/drawingml/2006/main" xmlns:r="http://schemas.openxmlformats.org/officeDocument/2006/relationships" xmlns:p="http://schemas.openxmlformats.org/presentationml/2006/main">
-  <p:cSld>
-    <p:spTree>
-      <p:nvGrpSpPr>
-        <p:cNvPr id="1" name=""/>
-        <p:cNvGrpSpPr/>
-        <p:nvPr/>
-      </p:nvGrpSpPr>
-      <p:grpSpPr>
-        <a:xfrm>
-          <a:off x="0" y="0"/>
-          <a:ext cx="0" cy="0"/>
-          <a:chOff x="0" y="0"/>
-          <a:chExt cx="0" cy="0"/>
-        </a:xfrm>
-      </p:grpSpPr>
-      <p:sp>
-        <p:nvSpPr>
-          <p:cNvPr id="2" name="Title 1">
-            <a:extLst>
-              <a:ext uri="{FF2B5EF4-FFF2-40B4-BE49-F238E27FC236}">
-                <a16:creationId xmlns:a16="http://schemas.microsoft.com/office/drawing/2014/main" id="{2340C822-548F-4F2C-868D-9E924CA4C3DF}"/>
-              </a:ext>
-            </a:extLst>
-          </p:cNvPr>
-          <p:cNvSpPr>
-            <a:spLocks noGrp="1"/>
-          </p:cNvSpPr>
-          <p:nvPr>
-            <p:ph type="title"/>
-          </p:nvPr>
-        </p:nvSpPr>
-        <p:spPr/>
-        <p:txBody>
-          <a:bodyPr/>
-          <a:lstStyle/>
-          <a:p>
-            <a:r>
-              <a:rPr lang="en-IN" dirty="0"/>
-              <a:t>Ultrasonic sensor</a:t>
-            </a:r>
-          </a:p>
-        </p:txBody>
-      </p:sp>
-      <p:sp>
-        <p:nvSpPr>
-          <p:cNvPr id="3" name="Content Placeholder 2">
-            <a:extLst>
-              <a:ext uri="{FF2B5EF4-FFF2-40B4-BE49-F238E27FC236}">
-                <a16:creationId xmlns:a16="http://schemas.microsoft.com/office/drawing/2014/main" id="{86171FAB-B25B-40AD-8CFE-5082B5A3B303}"/>
-              </a:ext>
-            </a:extLst>
-          </p:cNvPr>
-          <p:cNvSpPr>
-            <a:spLocks noGrp="1"/>
-          </p:cNvSpPr>
-          <p:nvPr>
-            <p:ph idx="1"/>
-          </p:nvPr>
-        </p:nvSpPr>
-        <p:spPr>
-          <a:xfrm>
-            <a:off x="1141412" y="2249487"/>
-            <a:ext cx="5611813" cy="3541714"/>
-          </a:xfrm>
-        </p:spPr>
-        <p:txBody>
-          <a:bodyPr>
-            <a:normAutofit/>
-          </a:bodyPr>
-          <a:lstStyle/>
-          <a:p>
-            <a:r>
-              <a:rPr lang="en-US" altLang="en-US" sz="1600" dirty="0">
-                <a:latin typeface="Times New Roman" panose="02020603050405020304" pitchFamily="18" charset="0"/>
-                <a:ea typeface="Calibri" panose="020F0502020204030204" pitchFamily="34" charset="0"/>
-                <a:cs typeface="Times New Roman" panose="02020603050405020304" pitchFamily="18" charset="0"/>
-              </a:rPr>
-              <a:t>Ultrasonic sensors measure distance by transmitting pulses of ultrasonic sound-waves which propagates through the air</a:t>
-            </a:r>
-          </a:p>
-          <a:p>
-            <a:r>
-              <a:rPr lang="en-US" altLang="en-US" sz="1600" dirty="0">
-                <a:latin typeface="Times New Roman" panose="02020603050405020304" pitchFamily="18" charset="0"/>
-                <a:ea typeface="Calibri" panose="020F0502020204030204" pitchFamily="34" charset="0"/>
-                <a:cs typeface="Times New Roman" panose="02020603050405020304" pitchFamily="18" charset="0"/>
-              </a:rPr>
-              <a:t>Reflected wave is received by the sensor when there is an object in front of them.</a:t>
-            </a:r>
-          </a:p>
-          <a:p>
-            <a:r>
-              <a:rPr lang="en-US" altLang="en-US" sz="1600" dirty="0">
-                <a:latin typeface="Times New Roman" panose="02020603050405020304" pitchFamily="18" charset="0"/>
-                <a:ea typeface="Calibri" panose="020F0502020204030204" pitchFamily="34" charset="0"/>
-                <a:cs typeface="Times New Roman" panose="02020603050405020304" pitchFamily="18" charset="0"/>
-              </a:rPr>
-              <a:t> If there is an object in front of the sensor, the sound-waves reflects and returns to the receiver</a:t>
-            </a:r>
-          </a:p>
-          <a:p>
-            <a:r>
-              <a:rPr lang="en-US" altLang="en-US" sz="1600" dirty="0">
-                <a:latin typeface="Times New Roman" panose="02020603050405020304" pitchFamily="18" charset="0"/>
-                <a:ea typeface="Calibri" panose="020F0502020204030204" pitchFamily="34" charset="0"/>
-                <a:cs typeface="Times New Roman" panose="02020603050405020304" pitchFamily="18" charset="0"/>
-              </a:rPr>
-              <a:t>One problem with them is that if the object in front of the sensor is tilted relative to the sensor’s transceiver, only such a small amount of the sound-wave will be reflected back to the sensor that the object won’t be detected</a:t>
-            </a:r>
-            <a:endParaRPr lang="en-IN" sz="1600" dirty="0"/>
-          </a:p>
-        </p:txBody>
-      </p:sp>
-      <p:pic>
-        <p:nvPicPr>
-          <p:cNvPr id="2049" name="Picture 4">
-            <a:extLst>
-              <a:ext uri="{FF2B5EF4-FFF2-40B4-BE49-F238E27FC236}">
-                <a16:creationId xmlns:a16="http://schemas.microsoft.com/office/drawing/2014/main" id="{5699CE44-E95E-4110-9F08-CC30E3C393DA}"/>
-              </a:ext>
-            </a:extLst>
-          </p:cNvPr>
-          <p:cNvPicPr>
-            <a:picLocks noChangeAspect="1" noChangeArrowheads="1"/>
-          </p:cNvPicPr>
-          <p:nvPr/>
-        </p:nvPicPr>
-        <p:blipFill>
-          <a:blip r:embed="rId2">
-            <a:extLst>
-              <a:ext uri="{28A0092B-C50C-407E-A947-70E740481C1C}">
-                <a14:useLocalDpi xmlns:a14="http://schemas.microsoft.com/office/drawing/2010/main" val="0"/>
-              </a:ext>
-            </a:extLst>
-          </a:blip>
-          <a:srcRect/>
-          <a:stretch>
-            <a:fillRect/>
-          </a:stretch>
-        </p:blipFill>
-        <p:spPr bwMode="auto">
-          <a:xfrm>
-            <a:off x="4508500" y="7226300"/>
-            <a:ext cx="1327150" cy="1327150"/>
-          </a:xfrm>
-          <a:prstGeom prst="rect">
-            <a:avLst/>
-          </a:prstGeom>
-          <a:noFill/>
-          <a:extLst>
-            <a:ext uri="{909E8E84-426E-40DD-AFC4-6F175D3DCCD1}">
-              <a14:hiddenFill xmlns:a14="http://schemas.microsoft.com/office/drawing/2010/main">
-                <a:solidFill>
-                  <a:srgbClr val="FFFFFF"/>
-                </a:solidFill>
-              </a14:hiddenFill>
-            </a:ext>
-          </a:extLst>
-        </p:spPr>
-      </p:pic>
-      <p:pic>
-        <p:nvPicPr>
-          <p:cNvPr id="2052" name="Picture 4">
-            <a:extLst>
-              <a:ext uri="{FF2B5EF4-FFF2-40B4-BE49-F238E27FC236}">
-                <a16:creationId xmlns:a16="http://schemas.microsoft.com/office/drawing/2014/main" id="{B2EF0665-114D-4102-BFE5-2FF7038FE429}"/>
-              </a:ext>
-            </a:extLst>
-          </p:cNvPr>
-          <p:cNvPicPr>
-            <a:picLocks noChangeAspect="1" noChangeArrowheads="1"/>
-          </p:cNvPicPr>
-          <p:nvPr/>
-        </p:nvPicPr>
-        <p:blipFill>
-          <a:blip r:embed="rId2">
-            <a:extLst>
-              <a:ext uri="{28A0092B-C50C-407E-A947-70E740481C1C}">
-                <a14:useLocalDpi xmlns:a14="http://schemas.microsoft.com/office/drawing/2010/main" val="0"/>
-              </a:ext>
-            </a:extLst>
-          </a:blip>
-          <a:srcRect/>
-          <a:stretch>
-            <a:fillRect/>
-          </a:stretch>
-        </p:blipFill>
-        <p:spPr bwMode="auto">
-          <a:xfrm>
-            <a:off x="4508500" y="7226300"/>
-            <a:ext cx="1327150" cy="1327150"/>
-          </a:xfrm>
-          <a:prstGeom prst="rect">
-            <a:avLst/>
-          </a:prstGeom>
-          <a:noFill/>
-          <a:extLst>
-            <a:ext uri="{909E8E84-426E-40DD-AFC4-6F175D3DCCD1}">
-              <a14:hiddenFill xmlns:a14="http://schemas.microsoft.com/office/drawing/2010/main">
-                <a:solidFill>
-                  <a:srgbClr val="FFFFFF"/>
-                </a:solidFill>
-              </a14:hiddenFill>
-            </a:ext>
-          </a:extLst>
-        </p:spPr>
-      </p:pic>
-      <p:pic>
-        <p:nvPicPr>
-          <p:cNvPr id="9" name="Picture 8">
-            <a:extLst>
-              <a:ext uri="{FF2B5EF4-FFF2-40B4-BE49-F238E27FC236}">
-                <a16:creationId xmlns:a16="http://schemas.microsoft.com/office/drawing/2014/main" id="{F29F1CF5-C463-4068-ABE2-97699F63ADC0}"/>
-              </a:ext>
-            </a:extLst>
-          </p:cNvPr>
-          <p:cNvPicPr>
-            <a:picLocks noChangeAspect="1"/>
-          </p:cNvPicPr>
-          <p:nvPr/>
-        </p:nvPicPr>
-        <p:blipFill>
-          <a:blip r:embed="rId3"/>
-          <a:stretch>
-            <a:fillRect/>
-          </a:stretch>
-        </p:blipFill>
-        <p:spPr>
-          <a:xfrm>
-            <a:off x="7210425" y="2097088"/>
-            <a:ext cx="3257551" cy="3257551"/>
-          </a:xfrm>
-          <a:prstGeom prst="rect">
-            <a:avLst/>
-          </a:prstGeom>
-        </p:spPr>
-      </p:pic>
-    </p:spTree>
-    <p:extLst>
-      <p:ext uri="{BB962C8B-B14F-4D97-AF65-F5344CB8AC3E}">
-        <p14:creationId xmlns:p14="http://schemas.microsoft.com/office/powerpoint/2010/main" val="4272228729"/>
-      </p:ext>
-    </p:extLst>
-  </p:cSld>
-  <p:clrMapOvr>
-    <a:masterClrMapping/>
-  </p:clrMapOvr>
-</p:sld>
-</file>
-
-<file path=ppt/slides/slide5.xml><?xml version="1.0" encoding="utf-8"?>
-<p:sld xmlns:a="http://schemas.openxmlformats.org/drawingml/2006/main" xmlns:r="http://schemas.openxmlformats.org/officeDocument/2006/relationships" xmlns:p="http://schemas.openxmlformats.org/presentationml/2006/main">
-  <p:cSld>
-    <p:spTree>
-      <p:nvGrpSpPr>
-        <p:cNvPr id="1" name=""/>
-        <p:cNvGrpSpPr/>
-        <p:nvPr/>
-      </p:nvGrpSpPr>
-      <p:grpSpPr>
-        <a:xfrm>
-          <a:off x="0" y="0"/>
-          <a:ext cx="0" cy="0"/>
-          <a:chOff x="0" y="0"/>
-          <a:chExt cx="0" cy="0"/>
-        </a:xfrm>
-      </p:grpSpPr>
-      <p:sp>
-        <p:nvSpPr>
-          <p:cNvPr id="2" name="Title 1">
-            <a:extLst>
-              <a:ext uri="{FF2B5EF4-FFF2-40B4-BE49-F238E27FC236}">
-                <a16:creationId xmlns:a16="http://schemas.microsoft.com/office/drawing/2014/main" id="{F80CE48C-9907-43D8-A079-8FFFDACF842B}"/>
-              </a:ext>
-            </a:extLst>
-          </p:cNvPr>
-          <p:cNvSpPr>
-            <a:spLocks noGrp="1"/>
-          </p:cNvSpPr>
-          <p:nvPr>
-            <p:ph type="title"/>
-          </p:nvPr>
-        </p:nvSpPr>
-        <p:spPr/>
-        <p:txBody>
-          <a:bodyPr/>
-          <a:lstStyle/>
-          <a:p>
-            <a:r>
-              <a:rPr lang="en-IN" dirty="0"/>
-              <a:t>DC motor with gear drive</a:t>
-            </a:r>
-          </a:p>
-        </p:txBody>
-      </p:sp>
-      <p:sp>
-        <p:nvSpPr>
-          <p:cNvPr id="3" name="Content Placeholder 2">
-            <a:extLst>
-              <a:ext uri="{FF2B5EF4-FFF2-40B4-BE49-F238E27FC236}">
-                <a16:creationId xmlns:a16="http://schemas.microsoft.com/office/drawing/2014/main" id="{BE1E147A-AC47-482D-B839-0808C5419FEB}"/>
-              </a:ext>
-            </a:extLst>
-          </p:cNvPr>
-          <p:cNvSpPr>
-            <a:spLocks noGrp="1"/>
-          </p:cNvSpPr>
-          <p:nvPr>
-            <p:ph idx="1"/>
-          </p:nvPr>
-        </p:nvSpPr>
-        <p:spPr>
-          <a:xfrm>
-            <a:off x="1141413" y="2097088"/>
-            <a:ext cx="6345237" cy="4351338"/>
-          </a:xfrm>
-        </p:spPr>
-        <p:txBody>
-          <a:bodyPr>
-            <a:noAutofit/>
-          </a:bodyPr>
-          <a:lstStyle/>
-          <a:p>
-            <a:r>
-              <a:rPr lang="en-IN" sz="1600" dirty="0">
-                <a:latin typeface="Times New Roman" panose="02020603050405020304" pitchFamily="18" charset="0"/>
-                <a:cs typeface="Times New Roman" panose="02020603050405020304" pitchFamily="18" charset="0"/>
-              </a:rPr>
-              <a:t>DC motors are those class of rotary electrical motors that converts direct current (DC) electrical energy into mechanical energy</a:t>
-            </a:r>
-          </a:p>
-          <a:p>
-            <a:r>
-              <a:rPr lang="en-IN" sz="1600" dirty="0">
-                <a:latin typeface="Times New Roman" panose="02020603050405020304" pitchFamily="18" charset="0"/>
-                <a:cs typeface="Times New Roman" panose="02020603050405020304" pitchFamily="18" charset="0"/>
-              </a:rPr>
-              <a:t>The most common types rely on the forces produced by magnetic fields. Nearly all types of DC motors have some internal mechanism, either electromechanical or electronic, to periodically change the direction of current in part of the motor</a:t>
-            </a:r>
-          </a:p>
-          <a:p>
-            <a:r>
-              <a:rPr lang="en-IN" sz="1600" dirty="0">
-                <a:latin typeface="Times New Roman" panose="02020603050405020304" pitchFamily="18" charset="0"/>
-                <a:cs typeface="Times New Roman" panose="02020603050405020304" pitchFamily="18" charset="0"/>
-              </a:rPr>
-              <a:t> DC motors were the first form of motor widely used, as they could be powered from existing direct-current lighting power distribution systems</a:t>
-            </a:r>
-          </a:p>
-          <a:p>
-            <a:r>
-              <a:rPr lang="en-IN" sz="1600" dirty="0">
-                <a:latin typeface="Times New Roman" panose="02020603050405020304" pitchFamily="18" charset="0"/>
-                <a:cs typeface="Times New Roman" panose="02020603050405020304" pitchFamily="18" charset="0"/>
-              </a:rPr>
-              <a:t>A DC motor's speed can be controlled over a wide range</a:t>
-            </a:r>
-          </a:p>
-        </p:txBody>
-      </p:sp>
-      <p:pic>
-        <p:nvPicPr>
-          <p:cNvPr id="5" name="Picture 4">
-            <a:extLst>
-              <a:ext uri="{FF2B5EF4-FFF2-40B4-BE49-F238E27FC236}">
-                <a16:creationId xmlns:a16="http://schemas.microsoft.com/office/drawing/2014/main" id="{0783D8FE-3899-4ADA-B270-C4674B1DB91F}"/>
-              </a:ext>
-            </a:extLst>
-          </p:cNvPr>
-          <p:cNvPicPr>
-            <a:picLocks noChangeAspect="1"/>
-          </p:cNvPicPr>
-          <p:nvPr/>
-        </p:nvPicPr>
-        <p:blipFill>
-          <a:blip r:embed="rId2"/>
-          <a:stretch>
-            <a:fillRect/>
-          </a:stretch>
-        </p:blipFill>
-        <p:spPr>
-          <a:xfrm>
-            <a:off x="7934325" y="2165957"/>
-            <a:ext cx="3286125" cy="3286125"/>
-          </a:xfrm>
-          <a:prstGeom prst="rect">
-            <a:avLst/>
-          </a:prstGeom>
-        </p:spPr>
-      </p:pic>
-    </p:spTree>
-    <p:extLst>
-      <p:ext uri="{BB962C8B-B14F-4D97-AF65-F5344CB8AC3E}">
-        <p14:creationId xmlns:p14="http://schemas.microsoft.com/office/powerpoint/2010/main" val="1024972053"/>
-      </p:ext>
-    </p:extLst>
-  </p:cSld>
-  <p:clrMapOvr>
-    <a:masterClrMapping/>
-  </p:clrMapOvr>
-</p:sld>
-</file>
-
-<file path=ppt/slides/slide6.xml><?xml version="1.0" encoding="utf-8"?>
-<p:sld xmlns:a="http://schemas.openxmlformats.org/drawingml/2006/main" xmlns:r="http://schemas.openxmlformats.org/officeDocument/2006/relationships" xmlns:p="http://schemas.openxmlformats.org/presentationml/2006/main">
-  <p:cSld>
-    <p:spTree>
-      <p:nvGrpSpPr>
-        <p:cNvPr id="1" name=""/>
-        <p:cNvGrpSpPr/>
-        <p:nvPr/>
-      </p:nvGrpSpPr>
-      <p:grpSpPr>
-        <a:xfrm>
-          <a:off x="0" y="0"/>
-          <a:ext cx="0" cy="0"/>
-          <a:chOff x="0" y="0"/>
-          <a:chExt cx="0" cy="0"/>
-        </a:xfrm>
-      </p:grpSpPr>
-      <p:sp>
-        <p:nvSpPr>
-          <p:cNvPr id="2" name="Title 1">
-            <a:extLst>
-              <a:ext uri="{FF2B5EF4-FFF2-40B4-BE49-F238E27FC236}">
-                <a16:creationId xmlns:a16="http://schemas.microsoft.com/office/drawing/2014/main" id="{D3119577-4EB2-475F-B52A-B609C567AD88}"/>
-              </a:ext>
-            </a:extLst>
-          </p:cNvPr>
-          <p:cNvSpPr>
-            <a:spLocks noGrp="1"/>
-          </p:cNvSpPr>
-          <p:nvPr>
-            <p:ph type="title"/>
-          </p:nvPr>
-        </p:nvSpPr>
-        <p:spPr/>
-        <p:txBody>
-          <a:bodyPr/>
-          <a:lstStyle/>
-          <a:p>
-            <a:r>
-              <a:rPr lang="en-IN" dirty="0"/>
-              <a:t>Motor Driver (L293D)</a:t>
-            </a:r>
-            <a:br>
-              <a:rPr lang="en-IN" dirty="0"/>
-            </a:br>
-            <a:endParaRPr lang="en-IN" dirty="0"/>
-          </a:p>
-        </p:txBody>
-      </p:sp>
-      <p:sp>
-        <p:nvSpPr>
-          <p:cNvPr id="3" name="Content Placeholder 2">
-            <a:extLst>
-              <a:ext uri="{FF2B5EF4-FFF2-40B4-BE49-F238E27FC236}">
-                <a16:creationId xmlns:a16="http://schemas.microsoft.com/office/drawing/2014/main" id="{FA2CC252-F25C-4B97-B7D9-51BB6C2D1B71}"/>
-              </a:ext>
-            </a:extLst>
-          </p:cNvPr>
-          <p:cNvSpPr>
-            <a:spLocks noGrp="1"/>
-          </p:cNvSpPr>
-          <p:nvPr>
-            <p:ph idx="1"/>
-          </p:nvPr>
-        </p:nvSpPr>
-        <p:spPr>
-          <a:xfrm>
-            <a:off x="979488" y="1849436"/>
-            <a:ext cx="6964362" cy="4170363"/>
-          </a:xfrm>
-        </p:spPr>
-        <p:txBody>
-          <a:bodyPr>
-            <a:noAutofit/>
-          </a:bodyPr>
-          <a:lstStyle/>
-          <a:p>
-            <a:r>
-              <a:rPr lang="en-IN" sz="1600" dirty="0">
-                <a:latin typeface="Times New Roman" panose="02020603050405020304" pitchFamily="18" charset="0"/>
-                <a:cs typeface="Times New Roman" panose="02020603050405020304" pitchFamily="18" charset="0"/>
-              </a:rPr>
-              <a:t>The L293D is quadruple high-current half-H drivers</a:t>
-            </a:r>
-          </a:p>
-          <a:p>
-            <a:r>
-              <a:rPr lang="en-IN" sz="1600" dirty="0">
-                <a:latin typeface="Times New Roman" panose="02020603050405020304" pitchFamily="18" charset="0"/>
-                <a:cs typeface="Times New Roman" panose="02020603050405020304" pitchFamily="18" charset="0"/>
-              </a:rPr>
-              <a:t>It is designed to provide bidirectional drive currents of up to 600-mA at voltages from 4.5 V to 36 V</a:t>
-            </a:r>
-          </a:p>
-          <a:p>
-            <a:r>
-              <a:rPr lang="en-IN" sz="1600" dirty="0">
-                <a:latin typeface="Times New Roman" panose="02020603050405020304" pitchFamily="18" charset="0"/>
-                <a:cs typeface="Times New Roman" panose="02020603050405020304" pitchFamily="18" charset="0"/>
-              </a:rPr>
-              <a:t> Both devices are designed to drive inductive loads such as relays, solenoids, dc and bipolar stepping motors, as well as other high-current/high-voltage loads in positive-supply applications</a:t>
-            </a:r>
-          </a:p>
-          <a:p>
-            <a:r>
-              <a:rPr lang="en-IN" sz="1600" dirty="0">
-                <a:latin typeface="Times New Roman" panose="02020603050405020304" pitchFamily="18" charset="0"/>
-                <a:cs typeface="Times New Roman" panose="02020603050405020304" pitchFamily="18" charset="0"/>
-              </a:rPr>
-              <a:t> All inputs are TTL compatible. Each output is a complete totem-pole drive circuit, with a Darlington transistor sink and a pseudo- Darlington source</a:t>
-            </a:r>
-          </a:p>
-          <a:p>
-            <a:r>
-              <a:rPr lang="en-IN" sz="1600" dirty="0">
-                <a:latin typeface="Times New Roman" panose="02020603050405020304" pitchFamily="18" charset="0"/>
-                <a:cs typeface="Times New Roman" panose="02020603050405020304" pitchFamily="18" charset="0"/>
-              </a:rPr>
-              <a:t>Drivers are enabled in pairs, with drivers 1 and 2 enabled by 1,2EN and drivers 3 and 4 enabled by 3,4EN</a:t>
-            </a:r>
-          </a:p>
-        </p:txBody>
-      </p:sp>
-      <p:pic>
-        <p:nvPicPr>
-          <p:cNvPr id="5" name="Picture 4">
-            <a:extLst>
-              <a:ext uri="{FF2B5EF4-FFF2-40B4-BE49-F238E27FC236}">
-                <a16:creationId xmlns:a16="http://schemas.microsoft.com/office/drawing/2014/main" id="{8D68628B-AA64-403C-8519-7831EA0B3D55}"/>
-              </a:ext>
-            </a:extLst>
-          </p:cNvPr>
-          <p:cNvPicPr>
-            <a:picLocks noChangeAspect="1"/>
-          </p:cNvPicPr>
-          <p:nvPr/>
-        </p:nvPicPr>
-        <p:blipFill>
-          <a:blip r:embed="rId2"/>
-          <a:stretch>
-            <a:fillRect/>
-          </a:stretch>
-        </p:blipFill>
-        <p:spPr>
-          <a:xfrm>
-            <a:off x="8105775" y="2097088"/>
-            <a:ext cx="3386138" cy="3386138"/>
-          </a:xfrm>
-          <a:prstGeom prst="rect">
-            <a:avLst/>
-          </a:prstGeom>
-        </p:spPr>
-      </p:pic>
-    </p:spTree>
-    <p:extLst>
-      <p:ext uri="{BB962C8B-B14F-4D97-AF65-F5344CB8AC3E}">
-        <p14:creationId xmlns:p14="http://schemas.microsoft.com/office/powerpoint/2010/main" val="744237103"/>
-      </p:ext>
-    </p:extLst>
-  </p:cSld>
-  <p:clrMapOvr>
-    <a:masterClrMapping/>
-  </p:clrMapOvr>
-</p:sld>
-</file>
-
-<file path=ppt/slides/slide7.xml><?xml version="1.0" encoding="utf-8"?>
-<p:sld xmlns:a="http://schemas.openxmlformats.org/drawingml/2006/main" xmlns:r="http://schemas.openxmlformats.org/officeDocument/2006/relationships" xmlns:p="http://schemas.openxmlformats.org/presentationml/2006/main">
-  <p:cSld>
-    <p:spTree>
-      <p:nvGrpSpPr>
-        <p:cNvPr id="1" name=""/>
-        <p:cNvGrpSpPr/>
-        <p:nvPr/>
-      </p:nvGrpSpPr>
-      <p:grpSpPr>
-        <a:xfrm>
-          <a:off x="0" y="0"/>
-          <a:ext cx="0" cy="0"/>
-          <a:chOff x="0" y="0"/>
-          <a:chExt cx="0" cy="0"/>
-        </a:xfrm>
-      </p:grpSpPr>
-      <p:sp>
-        <p:nvSpPr>
-          <p:cNvPr id="2" name="Title 1">
-            <a:extLst>
-              <a:ext uri="{FF2B5EF4-FFF2-40B4-BE49-F238E27FC236}">
-                <a16:creationId xmlns:a16="http://schemas.microsoft.com/office/drawing/2014/main" id="{58494240-8FDB-4761-B8A3-AE58ECCD9A0B}"/>
-              </a:ext>
-            </a:extLst>
-          </p:cNvPr>
-          <p:cNvSpPr>
-            <a:spLocks noGrp="1"/>
-          </p:cNvSpPr>
-          <p:nvPr>
-            <p:ph type="title"/>
-          </p:nvPr>
-        </p:nvSpPr>
-        <p:spPr>
-          <a:xfrm>
-            <a:off x="874713" y="370867"/>
-            <a:ext cx="9905998" cy="1478570"/>
-          </a:xfrm>
-        </p:spPr>
-        <p:txBody>
-          <a:bodyPr/>
-          <a:lstStyle/>
-          <a:p>
-            <a:r>
-              <a:rPr lang="en-IN" dirty="0"/>
-              <a:t>Code and algorithm</a:t>
-            </a:r>
-          </a:p>
-        </p:txBody>
-      </p:sp>
-      <p:pic>
-        <p:nvPicPr>
-          <p:cNvPr id="5" name="Content Placeholder 4">
-            <a:extLst>
-              <a:ext uri="{FF2B5EF4-FFF2-40B4-BE49-F238E27FC236}">
-                <a16:creationId xmlns:a16="http://schemas.microsoft.com/office/drawing/2014/main" id="{A24DA1A2-820A-4929-9B5C-0888C3CDF880}"/>
-              </a:ext>
-            </a:extLst>
-          </p:cNvPr>
-          <p:cNvPicPr>
-            <a:picLocks noGrp="1" noChangeAspect="1"/>
-          </p:cNvPicPr>
-          <p:nvPr>
-            <p:ph idx="1"/>
-          </p:nvPr>
-        </p:nvPicPr>
-        <p:blipFill>
-          <a:blip r:embed="rId2"/>
-          <a:stretch>
-            <a:fillRect/>
-          </a:stretch>
-        </p:blipFill>
-        <p:spPr>
-          <a:xfrm>
-            <a:off x="2579401" y="1849437"/>
-            <a:ext cx="7030022" cy="4763781"/>
-          </a:xfrm>
-        </p:spPr>
-      </p:pic>
-    </p:spTree>
-    <p:extLst>
-      <p:ext uri="{BB962C8B-B14F-4D97-AF65-F5344CB8AC3E}">
-        <p14:creationId xmlns:p14="http://schemas.microsoft.com/office/powerpoint/2010/main" val="156409760"/>
-      </p:ext>
-    </p:extLst>
-  </p:cSld>
-  <p:clrMapOvr>
-    <a:masterClrMapping/>
-  </p:clrMapOvr>
-</p:sld>
-</file>
-
-<file path=ppt/slides/slide8.xml><?xml version="1.0" encoding="utf-8"?>
-<p:sld xmlns:a="http://schemas.openxmlformats.org/drawingml/2006/main" xmlns:r="http://schemas.openxmlformats.org/officeDocument/2006/relationships" xmlns:p="http://schemas.openxmlformats.org/presentationml/2006/main">
-  <p:cSld>
-    <p:spTree>
-      <p:nvGrpSpPr>
-        <p:cNvPr id="1" name=""/>
-        <p:cNvGrpSpPr/>
-        <p:nvPr/>
-      </p:nvGrpSpPr>
-      <p:grpSpPr>
-        <a:xfrm>
-          <a:off x="0" y="0"/>
-          <a:ext cx="0" cy="0"/>
-          <a:chOff x="0" y="0"/>
-          <a:chExt cx="0" cy="0"/>
-        </a:xfrm>
-      </p:grpSpPr>
-      <p:sp>
-        <p:nvSpPr>
-          <p:cNvPr id="2" name="Title 1">
-            <a:extLst>
-              <a:ext uri="{FF2B5EF4-FFF2-40B4-BE49-F238E27FC236}">
-                <a16:creationId xmlns:a16="http://schemas.microsoft.com/office/drawing/2014/main" id="{16148562-5A2E-4189-9C70-89190A69B67D}"/>
-              </a:ext>
-            </a:extLst>
-          </p:cNvPr>
-          <p:cNvSpPr>
-            <a:spLocks noGrp="1"/>
-          </p:cNvSpPr>
-          <p:nvPr>
-            <p:ph type="title"/>
-          </p:nvPr>
-        </p:nvSpPr>
-        <p:spPr/>
-        <p:txBody>
-          <a:bodyPr/>
-          <a:lstStyle/>
-          <a:p>
-            <a:r>
-              <a:rPr lang="en-IN" dirty="0"/>
-              <a:t>Circuit</a:t>
-            </a:r>
-          </a:p>
-        </p:txBody>
-      </p:sp>
-      <p:pic>
-        <p:nvPicPr>
-          <p:cNvPr id="5" name="Content Placeholder 4">
-            <a:extLst>
-              <a:ext uri="{FF2B5EF4-FFF2-40B4-BE49-F238E27FC236}">
-                <a16:creationId xmlns:a16="http://schemas.microsoft.com/office/drawing/2014/main" id="{369B2458-CE55-43AD-A175-3417BC4A0649}"/>
-              </a:ext>
-            </a:extLst>
-          </p:cNvPr>
-          <p:cNvPicPr>
-            <a:picLocks noGrp="1" noChangeAspect="1"/>
-          </p:cNvPicPr>
-          <p:nvPr>
-            <p:ph idx="1"/>
-          </p:nvPr>
-        </p:nvPicPr>
-        <p:blipFill>
-          <a:blip r:embed="rId2"/>
-          <a:stretch>
-            <a:fillRect/>
-          </a:stretch>
-        </p:blipFill>
-        <p:spPr>
-          <a:xfrm>
-            <a:off x="1435679" y="2097088"/>
-            <a:ext cx="8989755" cy="3913187"/>
-          </a:xfrm>
-        </p:spPr>
-      </p:pic>
-    </p:spTree>
-    <p:extLst>
-      <p:ext uri="{BB962C8B-B14F-4D97-AF65-F5344CB8AC3E}">
-        <p14:creationId xmlns:p14="http://schemas.microsoft.com/office/powerpoint/2010/main" val="1988720397"/>
-      </p:ext>
-    </p:extLst>
-  </p:cSld>
-  <p:clrMapOvr>
-    <a:masterClrMapping/>
-  </p:clrMapOvr>
-</p:sld>
-</file>
-
-<file path=ppt/slides/slide9.xml><?xml version="1.0" encoding="utf-8"?>
+<file path=ppt/slides/slide10.xml><?xml version="1.0" encoding="utf-8"?>
 <p:sld xmlns:a="http://schemas.openxmlformats.org/drawingml/2006/main" xmlns:r="http://schemas.openxmlformats.org/officeDocument/2006/relationships" xmlns:p="http://schemas.openxmlformats.org/presentationml/2006/main">
   <p:cSld>
     <p:spTree>
@@ -13501,6 +12557,9 @@
         </p:txBody>
       </p:sp>
     </p:spTree>
+    <p:custDataLst>
+      <p:tags r:id="rId1"/>
+    </p:custDataLst>
     <p:extLst>
       <p:ext uri="{BB962C8B-B14F-4D97-AF65-F5344CB8AC3E}">
         <p14:creationId xmlns:p14="http://schemas.microsoft.com/office/powerpoint/2010/main" val="1932549324"/>
@@ -13510,7 +12569,3558 @@
   <p:clrMapOvr>
     <a:masterClrMapping/>
   </p:clrMapOvr>
+  <p:timing>
+    <p:tnLst>
+      <p:par>
+        <p:cTn id="1" dur="indefinite" restart="never" nodeType="tmRoot">
+          <p:childTnLst>
+            <p:seq concurrent="1" nextAc="seek">
+              <p:cTn id="2" dur="indefinite" nodeType="mainSeq">
+                <p:childTnLst>
+                  <p:par>
+                    <p:cTn id="3" fill="hold">
+                      <p:stCondLst>
+                        <p:cond delay="indefinite"/>
+                      </p:stCondLst>
+                      <p:childTnLst>
+                        <p:par>
+                          <p:cTn id="4" fill="hold">
+                            <p:stCondLst>
+                              <p:cond delay="0"/>
+                            </p:stCondLst>
+                            <p:childTnLst>
+                              <p:par>
+                                <p:cTn id="5" presetID="10" presetClass="entr" presetSubtype="0" fill="hold" grpId="0" nodeType="clickEffect">
+                                  <p:stCondLst>
+                                    <p:cond delay="0"/>
+                                  </p:stCondLst>
+                                  <p:childTnLst>
+                                    <p:set>
+                                      <p:cBhvr>
+                                        <p:cTn id="6" dur="1" fill="hold">
+                                          <p:stCondLst>
+                                            <p:cond delay="0"/>
+                                          </p:stCondLst>
+                                        </p:cTn>
+                                        <p:tgtEl>
+                                          <p:spTgt spid="2"/>
+                                        </p:tgtEl>
+                                        <p:attrNameLst>
+                                          <p:attrName>style.visibility</p:attrName>
+                                        </p:attrNameLst>
+                                      </p:cBhvr>
+                                      <p:to>
+                                        <p:strVal val="visible"/>
+                                      </p:to>
+                                    </p:set>
+                                    <p:animEffect transition="in" filter="fade">
+                                      <p:cBhvr>
+                                        <p:cTn id="7" dur="500"/>
+                                        <p:tgtEl>
+                                          <p:spTgt spid="2"/>
+                                        </p:tgtEl>
+                                      </p:cBhvr>
+                                    </p:animEffect>
+                                  </p:childTnLst>
+                                </p:cTn>
+                              </p:par>
+                            </p:childTnLst>
+                          </p:cTn>
+                        </p:par>
+                      </p:childTnLst>
+                    </p:cTn>
+                  </p:par>
+                </p:childTnLst>
+              </p:cTn>
+              <p:prevCondLst>
+                <p:cond evt="onPrev" delay="0">
+                  <p:tgtEl>
+                    <p:sldTgt/>
+                  </p:tgtEl>
+                </p:cond>
+              </p:prevCondLst>
+              <p:nextCondLst>
+                <p:cond evt="onNext" delay="0">
+                  <p:tgtEl>
+                    <p:sldTgt/>
+                  </p:tgtEl>
+                </p:cond>
+              </p:nextCondLst>
+            </p:seq>
+          </p:childTnLst>
+        </p:cTn>
+      </p:par>
+    </p:tnLst>
+    <p:bldLst>
+      <p:bldP spid="2" grpId="0"/>
+    </p:bldLst>
+  </p:timing>
 </p:sld>
+</file>
+
+<file path=ppt/slides/slide2.xml><?xml version="1.0" encoding="utf-8"?>
+<p:sld xmlns:a="http://schemas.openxmlformats.org/drawingml/2006/main" xmlns:r="http://schemas.openxmlformats.org/officeDocument/2006/relationships" xmlns:p="http://schemas.openxmlformats.org/presentationml/2006/main">
+  <p:cSld>
+    <p:spTree>
+      <p:nvGrpSpPr>
+        <p:cNvPr id="1" name=""/>
+        <p:cNvGrpSpPr/>
+        <p:nvPr/>
+      </p:nvGrpSpPr>
+      <p:grpSpPr>
+        <a:xfrm>
+          <a:off x="0" y="0"/>
+          <a:ext cx="0" cy="0"/>
+          <a:chOff x="0" y="0"/>
+          <a:chExt cx="0" cy="0"/>
+        </a:xfrm>
+      </p:grpSpPr>
+      <p:sp>
+        <p:nvSpPr>
+          <p:cNvPr id="2" name="Title 1">
+            <a:extLst>
+              <a:ext uri="{FF2B5EF4-FFF2-40B4-BE49-F238E27FC236}">
+                <a16:creationId xmlns:a16="http://schemas.microsoft.com/office/drawing/2014/main" id="{259BBA9E-F40D-45B2-98DB-0EC0C4331681}"/>
+              </a:ext>
+            </a:extLst>
+          </p:cNvPr>
+          <p:cNvSpPr>
+            <a:spLocks noGrp="1"/>
+          </p:cNvSpPr>
+          <p:nvPr>
+            <p:ph type="title"/>
+          </p:nvPr>
+        </p:nvSpPr>
+        <p:spPr/>
+        <p:txBody>
+          <a:bodyPr/>
+          <a:lstStyle/>
+          <a:p>
+            <a:r>
+              <a:rPr lang="en-IN" dirty="0"/>
+              <a:t>What is </a:t>
+            </a:r>
+            <a:r>
+              <a:rPr lang="en-US" dirty="0"/>
+              <a:t>obstacle avoiding robot ?</a:t>
+            </a:r>
+            <a:endParaRPr lang="en-IN" dirty="0"/>
+          </a:p>
+        </p:txBody>
+      </p:sp>
+      <p:sp>
+        <p:nvSpPr>
+          <p:cNvPr id="3" name="Content Placeholder 2">
+            <a:extLst>
+              <a:ext uri="{FF2B5EF4-FFF2-40B4-BE49-F238E27FC236}">
+                <a16:creationId xmlns:a16="http://schemas.microsoft.com/office/drawing/2014/main" id="{2AD4F6FD-7DC2-4F07-B6F1-A7D6EE464198}"/>
+              </a:ext>
+            </a:extLst>
+          </p:cNvPr>
+          <p:cNvSpPr>
+            <a:spLocks noGrp="1"/>
+          </p:cNvSpPr>
+          <p:nvPr>
+            <p:ph idx="1"/>
+          </p:nvPr>
+        </p:nvSpPr>
+        <p:spPr>
+          <a:xfrm>
+            <a:off x="1141412" y="2249487"/>
+            <a:ext cx="5935663" cy="3532188"/>
+          </a:xfrm>
+        </p:spPr>
+        <p:txBody>
+          <a:bodyPr>
+            <a:normAutofit/>
+          </a:bodyPr>
+          <a:lstStyle/>
+          <a:p>
+            <a:r>
+              <a:rPr lang="en-US" sz="1800" dirty="0">
+                <a:latin typeface="Times New Roman" panose="02020603050405020304" pitchFamily="18" charset="0"/>
+                <a:cs typeface="Times New Roman" panose="02020603050405020304" pitchFamily="18" charset="0"/>
+              </a:rPr>
+              <a:t>An intelligent device, which can automatically sense and overcome obstacles on its path.</a:t>
+            </a:r>
+          </a:p>
+          <a:p>
+            <a:r>
+              <a:rPr lang="en-US" sz="1800" dirty="0">
+                <a:latin typeface="Times New Roman" panose="02020603050405020304" pitchFamily="18" charset="0"/>
+                <a:cs typeface="Times New Roman" panose="02020603050405020304" pitchFamily="18" charset="0"/>
+              </a:rPr>
+              <a:t> Obstacle Avoidance is a robotic discipline with the objective of moving vehicles on the basis of the sensorial information. </a:t>
+            </a:r>
+          </a:p>
+          <a:p>
+            <a:r>
+              <a:rPr lang="en-US" sz="1800" dirty="0">
+                <a:latin typeface="Times New Roman" panose="02020603050405020304" pitchFamily="18" charset="0"/>
+                <a:cs typeface="Times New Roman" panose="02020603050405020304" pitchFamily="18" charset="0"/>
+              </a:rPr>
+              <a:t>In these cases, the surroundings do not remain invariable, and thus the sensory information is used to detect the changes consequently adapting moving. </a:t>
+            </a:r>
+          </a:p>
+        </p:txBody>
+      </p:sp>
+      <p:pic>
+        <p:nvPicPr>
+          <p:cNvPr id="5" name="Picture 4">
+            <a:extLst>
+              <a:ext uri="{FF2B5EF4-FFF2-40B4-BE49-F238E27FC236}">
+                <a16:creationId xmlns:a16="http://schemas.microsoft.com/office/drawing/2014/main" id="{6BFFB46F-7A33-4209-85BD-A7B062DB04EF}"/>
+              </a:ext>
+            </a:extLst>
+          </p:cNvPr>
+          <p:cNvPicPr>
+            <a:picLocks noChangeAspect="1"/>
+          </p:cNvPicPr>
+          <p:nvPr/>
+        </p:nvPicPr>
+        <p:blipFill>
+          <a:blip r:embed="rId3"/>
+          <a:stretch>
+            <a:fillRect/>
+          </a:stretch>
+        </p:blipFill>
+        <p:spPr>
+          <a:xfrm>
+            <a:off x="7276849" y="2000436"/>
+            <a:ext cx="4151438" cy="3138487"/>
+          </a:xfrm>
+          <a:prstGeom prst="rect">
+            <a:avLst/>
+          </a:prstGeom>
+        </p:spPr>
+      </p:pic>
+    </p:spTree>
+    <p:custDataLst>
+      <p:tags r:id="rId1"/>
+    </p:custDataLst>
+    <p:extLst>
+      <p:ext uri="{BB962C8B-B14F-4D97-AF65-F5344CB8AC3E}">
+        <p14:creationId xmlns:p14="http://schemas.microsoft.com/office/powerpoint/2010/main" val="4261150730"/>
+      </p:ext>
+    </p:extLst>
+  </p:cSld>
+  <p:clrMapOvr>
+    <a:masterClrMapping/>
+  </p:clrMapOvr>
+  <p:timing>
+    <p:tnLst>
+      <p:par>
+        <p:cTn id="1" dur="indefinite" restart="never" nodeType="tmRoot">
+          <p:childTnLst>
+            <p:seq concurrent="1" nextAc="seek">
+              <p:cTn id="2" dur="indefinite" nodeType="mainSeq">
+                <p:childTnLst>
+                  <p:par>
+                    <p:cTn id="3" fill="hold">
+                      <p:stCondLst>
+                        <p:cond delay="indefinite"/>
+                      </p:stCondLst>
+                      <p:childTnLst>
+                        <p:par>
+                          <p:cTn id="4" fill="hold">
+                            <p:stCondLst>
+                              <p:cond delay="0"/>
+                            </p:stCondLst>
+                            <p:childTnLst>
+                              <p:par>
+                                <p:cTn id="5" presetID="1" presetClass="entr" presetSubtype="0" fill="hold" nodeType="clickEffect">
+                                  <p:stCondLst>
+                                    <p:cond delay="0"/>
+                                  </p:stCondLst>
+                                  <p:childTnLst>
+                                    <p:set>
+                                      <p:cBhvr>
+                                        <p:cTn id="6" dur="1" fill="hold">
+                                          <p:stCondLst>
+                                            <p:cond delay="0"/>
+                                          </p:stCondLst>
+                                        </p:cTn>
+                                        <p:tgtEl>
+                                          <p:spTgt spid="5"/>
+                                        </p:tgtEl>
+                                        <p:attrNameLst>
+                                          <p:attrName>style.visibility</p:attrName>
+                                        </p:attrNameLst>
+                                      </p:cBhvr>
+                                      <p:to>
+                                        <p:strVal val="visible"/>
+                                      </p:to>
+                                    </p:set>
+                                  </p:childTnLst>
+                                </p:cTn>
+                              </p:par>
+                            </p:childTnLst>
+                          </p:cTn>
+                        </p:par>
+                      </p:childTnLst>
+                    </p:cTn>
+                  </p:par>
+                  <p:par>
+                    <p:cTn id="7" fill="hold">
+                      <p:stCondLst>
+                        <p:cond delay="indefinite"/>
+                      </p:stCondLst>
+                      <p:childTnLst>
+                        <p:par>
+                          <p:cTn id="8" fill="hold">
+                            <p:stCondLst>
+                              <p:cond delay="0"/>
+                            </p:stCondLst>
+                            <p:childTnLst>
+                              <p:par>
+                                <p:cTn id="9" presetID="10" presetClass="entr" presetSubtype="0" fill="hold" nodeType="clickEffect">
+                                  <p:stCondLst>
+                                    <p:cond delay="0"/>
+                                  </p:stCondLst>
+                                  <p:childTnLst>
+                                    <p:set>
+                                      <p:cBhvr>
+                                        <p:cTn id="10" dur="1" fill="hold">
+                                          <p:stCondLst>
+                                            <p:cond delay="0"/>
+                                          </p:stCondLst>
+                                        </p:cTn>
+                                        <p:tgtEl>
+                                          <p:spTgt spid="3">
+                                            <p:txEl>
+                                              <p:pRg st="0" end="0"/>
+                                            </p:txEl>
+                                          </p:spTgt>
+                                        </p:tgtEl>
+                                        <p:attrNameLst>
+                                          <p:attrName>style.visibility</p:attrName>
+                                        </p:attrNameLst>
+                                      </p:cBhvr>
+                                      <p:to>
+                                        <p:strVal val="visible"/>
+                                      </p:to>
+                                    </p:set>
+                                    <p:animEffect transition="in" filter="fade">
+                                      <p:cBhvr>
+                                        <p:cTn id="11" dur="500"/>
+                                        <p:tgtEl>
+                                          <p:spTgt spid="3">
+                                            <p:txEl>
+                                              <p:pRg st="0" end="0"/>
+                                            </p:txEl>
+                                          </p:spTgt>
+                                        </p:tgtEl>
+                                      </p:cBhvr>
+                                    </p:animEffect>
+                                  </p:childTnLst>
+                                </p:cTn>
+                              </p:par>
+                            </p:childTnLst>
+                          </p:cTn>
+                        </p:par>
+                      </p:childTnLst>
+                    </p:cTn>
+                  </p:par>
+                  <p:par>
+                    <p:cTn id="12" fill="hold">
+                      <p:stCondLst>
+                        <p:cond delay="indefinite"/>
+                      </p:stCondLst>
+                      <p:childTnLst>
+                        <p:par>
+                          <p:cTn id="13" fill="hold">
+                            <p:stCondLst>
+                              <p:cond delay="0"/>
+                            </p:stCondLst>
+                            <p:childTnLst>
+                              <p:par>
+                                <p:cTn id="14" presetID="10" presetClass="entr" presetSubtype="0" fill="hold" nodeType="clickEffect">
+                                  <p:stCondLst>
+                                    <p:cond delay="0"/>
+                                  </p:stCondLst>
+                                  <p:childTnLst>
+                                    <p:set>
+                                      <p:cBhvr>
+                                        <p:cTn id="15" dur="1" fill="hold">
+                                          <p:stCondLst>
+                                            <p:cond delay="0"/>
+                                          </p:stCondLst>
+                                        </p:cTn>
+                                        <p:tgtEl>
+                                          <p:spTgt spid="3">
+                                            <p:txEl>
+                                              <p:pRg st="1" end="1"/>
+                                            </p:txEl>
+                                          </p:spTgt>
+                                        </p:tgtEl>
+                                        <p:attrNameLst>
+                                          <p:attrName>style.visibility</p:attrName>
+                                        </p:attrNameLst>
+                                      </p:cBhvr>
+                                      <p:to>
+                                        <p:strVal val="visible"/>
+                                      </p:to>
+                                    </p:set>
+                                    <p:animEffect transition="in" filter="fade">
+                                      <p:cBhvr>
+                                        <p:cTn id="16" dur="500"/>
+                                        <p:tgtEl>
+                                          <p:spTgt spid="3">
+                                            <p:txEl>
+                                              <p:pRg st="1" end="1"/>
+                                            </p:txEl>
+                                          </p:spTgt>
+                                        </p:tgtEl>
+                                      </p:cBhvr>
+                                    </p:animEffect>
+                                  </p:childTnLst>
+                                </p:cTn>
+                              </p:par>
+                            </p:childTnLst>
+                          </p:cTn>
+                        </p:par>
+                      </p:childTnLst>
+                    </p:cTn>
+                  </p:par>
+                  <p:par>
+                    <p:cTn id="17" fill="hold">
+                      <p:stCondLst>
+                        <p:cond delay="indefinite"/>
+                      </p:stCondLst>
+                      <p:childTnLst>
+                        <p:par>
+                          <p:cTn id="18" fill="hold">
+                            <p:stCondLst>
+                              <p:cond delay="0"/>
+                            </p:stCondLst>
+                            <p:childTnLst>
+                              <p:par>
+                                <p:cTn id="19" presetID="10" presetClass="entr" presetSubtype="0" fill="hold" nodeType="clickEffect">
+                                  <p:stCondLst>
+                                    <p:cond delay="0"/>
+                                  </p:stCondLst>
+                                  <p:childTnLst>
+                                    <p:set>
+                                      <p:cBhvr>
+                                        <p:cTn id="20" dur="1" fill="hold">
+                                          <p:stCondLst>
+                                            <p:cond delay="0"/>
+                                          </p:stCondLst>
+                                        </p:cTn>
+                                        <p:tgtEl>
+                                          <p:spTgt spid="3">
+                                            <p:txEl>
+                                              <p:pRg st="2" end="2"/>
+                                            </p:txEl>
+                                          </p:spTgt>
+                                        </p:tgtEl>
+                                        <p:attrNameLst>
+                                          <p:attrName>style.visibility</p:attrName>
+                                        </p:attrNameLst>
+                                      </p:cBhvr>
+                                      <p:to>
+                                        <p:strVal val="visible"/>
+                                      </p:to>
+                                    </p:set>
+                                    <p:animEffect transition="in" filter="fade">
+                                      <p:cBhvr>
+                                        <p:cTn id="21" dur="500"/>
+                                        <p:tgtEl>
+                                          <p:spTgt spid="3">
+                                            <p:txEl>
+                                              <p:pRg st="2" end="2"/>
+                                            </p:txEl>
+                                          </p:spTgt>
+                                        </p:tgtEl>
+                                      </p:cBhvr>
+                                    </p:animEffect>
+                                  </p:childTnLst>
+                                </p:cTn>
+                              </p:par>
+                            </p:childTnLst>
+                          </p:cTn>
+                        </p:par>
+                      </p:childTnLst>
+                    </p:cTn>
+                  </p:par>
+                </p:childTnLst>
+              </p:cTn>
+              <p:prevCondLst>
+                <p:cond evt="onPrev" delay="0">
+                  <p:tgtEl>
+                    <p:sldTgt/>
+                  </p:tgtEl>
+                </p:cond>
+              </p:prevCondLst>
+              <p:nextCondLst>
+                <p:cond evt="onNext" delay="0">
+                  <p:tgtEl>
+                    <p:sldTgt/>
+                  </p:tgtEl>
+                </p:cond>
+              </p:nextCondLst>
+            </p:seq>
+          </p:childTnLst>
+        </p:cTn>
+      </p:par>
+    </p:tnLst>
+  </p:timing>
+</p:sld>
+</file>
+
+<file path=ppt/slides/slide3.xml><?xml version="1.0" encoding="utf-8"?>
+<p:sld xmlns:a="http://schemas.openxmlformats.org/drawingml/2006/main" xmlns:r="http://schemas.openxmlformats.org/officeDocument/2006/relationships" xmlns:p="http://schemas.openxmlformats.org/presentationml/2006/main">
+  <p:cSld>
+    <p:spTree>
+      <p:nvGrpSpPr>
+        <p:cNvPr id="1" name=""/>
+        <p:cNvGrpSpPr/>
+        <p:nvPr/>
+      </p:nvGrpSpPr>
+      <p:grpSpPr>
+        <a:xfrm>
+          <a:off x="0" y="0"/>
+          <a:ext cx="0" cy="0"/>
+          <a:chOff x="0" y="0"/>
+          <a:chExt cx="0" cy="0"/>
+        </a:xfrm>
+      </p:grpSpPr>
+      <p:sp>
+        <p:nvSpPr>
+          <p:cNvPr id="2" name="Title 1">
+            <a:extLst>
+              <a:ext uri="{FF2B5EF4-FFF2-40B4-BE49-F238E27FC236}">
+                <a16:creationId xmlns:a16="http://schemas.microsoft.com/office/drawing/2014/main" id="{53078717-AA87-4984-99E2-41502A7593E3}"/>
+              </a:ext>
+            </a:extLst>
+          </p:cNvPr>
+          <p:cNvSpPr>
+            <a:spLocks noGrp="1"/>
+          </p:cNvSpPr>
+          <p:nvPr>
+            <p:ph type="title"/>
+          </p:nvPr>
+        </p:nvSpPr>
+        <p:spPr/>
+        <p:txBody>
+          <a:bodyPr>
+            <a:normAutofit/>
+          </a:bodyPr>
+          <a:lstStyle/>
+          <a:p>
+            <a:r>
+              <a:rPr lang="en-IN" sz="2800" dirty="0">
+                <a:latin typeface="Artifakt Element Book" panose="020B0503050000020004" pitchFamily="34" charset="0"/>
+                <a:ea typeface="Artifakt Element Book" panose="020B0503050000020004" pitchFamily="34" charset="0"/>
+                <a:cs typeface="Adobe Arabic" panose="02040503050201020203" pitchFamily="18" charset="-78"/>
+              </a:rPr>
+              <a:t>Components Involved</a:t>
+            </a:r>
+          </a:p>
+        </p:txBody>
+      </p:sp>
+      <p:graphicFrame>
+        <p:nvGraphicFramePr>
+          <p:cNvPr id="3" name="Table 2">
+            <a:extLst>
+              <a:ext uri="{FF2B5EF4-FFF2-40B4-BE49-F238E27FC236}">
+                <a16:creationId xmlns:a16="http://schemas.microsoft.com/office/drawing/2014/main" id="{4D462319-A951-48C1-AA76-DEFEEF450BA3}"/>
+              </a:ext>
+            </a:extLst>
+          </p:cNvPr>
+          <p:cNvGraphicFramePr>
+            <a:graphicFrameLocks noGrp="1"/>
+          </p:cNvGraphicFramePr>
+          <p:nvPr>
+            <p:extLst>
+              <p:ext uri="{D42A27DB-BD31-4B8C-83A1-F6EECF244321}">
+                <p14:modId xmlns:p14="http://schemas.microsoft.com/office/powerpoint/2010/main" val="2612545241"/>
+              </p:ext>
+            </p:extLst>
+          </p:nvPr>
+        </p:nvGraphicFramePr>
+        <p:xfrm>
+          <a:off x="1450975" y="2097088"/>
+          <a:ext cx="8797926" cy="3166533"/>
+        </p:xfrm>
+        <a:graphic>
+          <a:graphicData uri="http://schemas.openxmlformats.org/drawingml/2006/table">
+            <a:tbl>
+              <a:tblPr firstRow="1" bandRow="1">
+                <a:tableStyleId>{5C22544A-7EE6-4342-B048-85BDC9FD1C3A}</a:tableStyleId>
+              </a:tblPr>
+              <a:tblGrid>
+                <a:gridCol w="2932642">
+                  <a:extLst>
+                    <a:ext uri="{9D8B030D-6E8A-4147-A177-3AD203B41FA5}">
+                      <a16:colId xmlns:a16="http://schemas.microsoft.com/office/drawing/2014/main" val="1673387160"/>
+                    </a:ext>
+                  </a:extLst>
+                </a:gridCol>
+                <a:gridCol w="1053919">
+                  <a:extLst>
+                    <a:ext uri="{9D8B030D-6E8A-4147-A177-3AD203B41FA5}">
+                      <a16:colId xmlns:a16="http://schemas.microsoft.com/office/drawing/2014/main" val="3175738316"/>
+                    </a:ext>
+                  </a:extLst>
+                </a:gridCol>
+                <a:gridCol w="4811365">
+                  <a:extLst>
+                    <a:ext uri="{9D8B030D-6E8A-4147-A177-3AD203B41FA5}">
+                      <a16:colId xmlns:a16="http://schemas.microsoft.com/office/drawing/2014/main" val="1575471453"/>
+                    </a:ext>
+                  </a:extLst>
+                </a:gridCol>
+              </a:tblGrid>
+              <a:tr h="576092">
+                <a:tc>
+                  <a:txBody>
+                    <a:bodyPr/>
+                    <a:lstStyle/>
+                    <a:p>
+                      <a:pPr algn="ctr" fontAlgn="b"/>
+                      <a:r>
+                        <a:rPr lang="en-IN" sz="1800" b="0" i="0" u="none" strike="noStrike" dirty="0">
+                          <a:solidFill>
+                            <a:srgbClr val="000000"/>
+                          </a:solidFill>
+                          <a:effectLst/>
+                          <a:latin typeface="Times New Roman" panose="02020603050405020304" pitchFamily="18" charset="0"/>
+                          <a:cs typeface="Times New Roman" panose="02020603050405020304" pitchFamily="18" charset="0"/>
+                        </a:rPr>
+                        <a:t>Name</a:t>
+                      </a:r>
+                    </a:p>
+                  </a:txBody>
+                  <a:tcPr marL="6350" marR="6350" marT="6350" marB="0" anchor="ctr"/>
+                </a:tc>
+                <a:tc>
+                  <a:txBody>
+                    <a:bodyPr/>
+                    <a:lstStyle/>
+                    <a:p>
+                      <a:pPr algn="ctr" fontAlgn="b"/>
+                      <a:r>
+                        <a:rPr lang="en-IN" sz="1800" b="0" i="0" u="none" strike="noStrike" dirty="0">
+                          <a:solidFill>
+                            <a:srgbClr val="000000"/>
+                          </a:solidFill>
+                          <a:effectLst/>
+                          <a:latin typeface="Times New Roman" panose="02020603050405020304" pitchFamily="18" charset="0"/>
+                          <a:cs typeface="Times New Roman" panose="02020603050405020304" pitchFamily="18" charset="0"/>
+                        </a:rPr>
+                        <a:t>Quantity</a:t>
+                      </a:r>
+                    </a:p>
+                  </a:txBody>
+                  <a:tcPr marL="6350" marR="6350" marT="6350" marB="0" anchor="ctr"/>
+                </a:tc>
+                <a:tc>
+                  <a:txBody>
+                    <a:bodyPr/>
+                    <a:lstStyle/>
+                    <a:p>
+                      <a:pPr algn="ctr" fontAlgn="b"/>
+                      <a:r>
+                        <a:rPr lang="en-IN" sz="1800" b="0" i="0" u="none" strike="noStrike" dirty="0">
+                          <a:solidFill>
+                            <a:srgbClr val="000000"/>
+                          </a:solidFill>
+                          <a:effectLst/>
+                          <a:latin typeface="Times New Roman" panose="02020603050405020304" pitchFamily="18" charset="0"/>
+                          <a:cs typeface="Times New Roman" panose="02020603050405020304" pitchFamily="18" charset="0"/>
+                        </a:rPr>
+                        <a:t>Component</a:t>
+                      </a:r>
+                    </a:p>
+                  </a:txBody>
+                  <a:tcPr marL="6350" marR="6350" marT="6350" marB="0" anchor="ctr"/>
+                </a:tc>
+                <a:extLst>
+                  <a:ext uri="{0D108BD9-81ED-4DB2-BD59-A6C34878D82A}">
+                    <a16:rowId xmlns:a16="http://schemas.microsoft.com/office/drawing/2014/main" val="583176133"/>
+                  </a:ext>
+                </a:extLst>
+              </a:tr>
+              <a:tr h="576092">
+                <a:tc>
+                  <a:txBody>
+                    <a:bodyPr/>
+                    <a:lstStyle/>
+                    <a:p>
+                      <a:pPr algn="l" fontAlgn="b"/>
+                      <a:r>
+                        <a:rPr lang="en-IN" sz="1800" b="0" i="0" u="none" strike="noStrike">
+                          <a:solidFill>
+                            <a:srgbClr val="000000"/>
+                          </a:solidFill>
+                          <a:effectLst/>
+                          <a:latin typeface="Times New Roman" panose="02020603050405020304" pitchFamily="18" charset="0"/>
+                          <a:cs typeface="Times New Roman" panose="02020603050405020304" pitchFamily="18" charset="0"/>
+                        </a:rPr>
+                        <a:t>U1</a:t>
+                      </a:r>
+                    </a:p>
+                  </a:txBody>
+                  <a:tcPr marL="6350" marR="6350" marT="6350" marB="0" anchor="b"/>
+                </a:tc>
+                <a:tc>
+                  <a:txBody>
+                    <a:bodyPr/>
+                    <a:lstStyle/>
+                    <a:p>
+                      <a:pPr algn="ctr" fontAlgn="b"/>
+                      <a:r>
+                        <a:rPr lang="en-IN" sz="1800" b="0" i="0" u="none" strike="noStrike" dirty="0">
+                          <a:solidFill>
+                            <a:srgbClr val="000000"/>
+                          </a:solidFill>
+                          <a:effectLst/>
+                          <a:latin typeface="Times New Roman" panose="02020603050405020304" pitchFamily="18" charset="0"/>
+                          <a:cs typeface="Times New Roman" panose="02020603050405020304" pitchFamily="18" charset="0"/>
+                        </a:rPr>
+                        <a:t>1</a:t>
+                      </a:r>
+                    </a:p>
+                  </a:txBody>
+                  <a:tcPr marL="6350" marR="6350" marT="6350" marB="0" anchor="b"/>
+                </a:tc>
+                <a:tc>
+                  <a:txBody>
+                    <a:bodyPr/>
+                    <a:lstStyle/>
+                    <a:p>
+                      <a:pPr algn="l" fontAlgn="b"/>
+                      <a:r>
+                        <a:rPr lang="en-IN" sz="1800" b="0" i="0" u="none" strike="noStrike">
+                          <a:solidFill>
+                            <a:srgbClr val="000000"/>
+                          </a:solidFill>
+                          <a:effectLst/>
+                          <a:latin typeface="Times New Roman" panose="02020603050405020304" pitchFamily="18" charset="0"/>
+                          <a:cs typeface="Times New Roman" panose="02020603050405020304" pitchFamily="18" charset="0"/>
+                        </a:rPr>
+                        <a:t> Arduino Uno R3</a:t>
+                      </a:r>
+                    </a:p>
+                  </a:txBody>
+                  <a:tcPr marL="6350" marR="6350" marT="6350" marB="0" anchor="b"/>
+                </a:tc>
+                <a:extLst>
+                  <a:ext uri="{0D108BD9-81ED-4DB2-BD59-A6C34878D82A}">
+                    <a16:rowId xmlns:a16="http://schemas.microsoft.com/office/drawing/2014/main" val="2343981602"/>
+                  </a:ext>
+                </a:extLst>
+              </a:tr>
+              <a:tr h="576092">
+                <a:tc>
+                  <a:txBody>
+                    <a:bodyPr/>
+                    <a:lstStyle/>
+                    <a:p>
+                      <a:pPr algn="l" fontAlgn="b"/>
+                      <a:r>
+                        <a:rPr lang="en-IN" sz="1800" b="0" i="0" u="none" strike="noStrike" dirty="0">
+                          <a:solidFill>
+                            <a:srgbClr val="000000"/>
+                          </a:solidFill>
+                          <a:effectLst/>
+                          <a:latin typeface="Times New Roman" panose="02020603050405020304" pitchFamily="18" charset="0"/>
+                          <a:cs typeface="Times New Roman" panose="02020603050405020304" pitchFamily="18" charset="0"/>
+                        </a:rPr>
+                        <a:t>M1, M2, M3, M5</a:t>
+                      </a:r>
+                    </a:p>
+                  </a:txBody>
+                  <a:tcPr marL="6350" marR="6350" marT="6350" marB="0" anchor="b"/>
+                </a:tc>
+                <a:tc>
+                  <a:txBody>
+                    <a:bodyPr/>
+                    <a:lstStyle/>
+                    <a:p>
+                      <a:pPr algn="ctr" fontAlgn="b"/>
+                      <a:r>
+                        <a:rPr lang="en-IN" sz="1800" b="0" i="0" u="none" strike="noStrike" dirty="0">
+                          <a:solidFill>
+                            <a:srgbClr val="000000"/>
+                          </a:solidFill>
+                          <a:effectLst/>
+                          <a:latin typeface="Times New Roman" panose="02020603050405020304" pitchFamily="18" charset="0"/>
+                          <a:cs typeface="Times New Roman" panose="02020603050405020304" pitchFamily="18" charset="0"/>
+                        </a:rPr>
+                        <a:t>4</a:t>
+                      </a:r>
+                    </a:p>
+                  </a:txBody>
+                  <a:tcPr marL="6350" marR="6350" marT="6350" marB="0" anchor="b"/>
+                </a:tc>
+                <a:tc>
+                  <a:txBody>
+                    <a:bodyPr/>
+                    <a:lstStyle/>
+                    <a:p>
+                      <a:pPr algn="l" fontAlgn="b"/>
+                      <a:r>
+                        <a:rPr lang="en-IN" sz="1800" b="0" i="0" u="none" strike="noStrike">
+                          <a:solidFill>
+                            <a:srgbClr val="000000"/>
+                          </a:solidFill>
+                          <a:effectLst/>
+                          <a:latin typeface="Times New Roman" panose="02020603050405020304" pitchFamily="18" charset="0"/>
+                          <a:cs typeface="Times New Roman" panose="02020603050405020304" pitchFamily="18" charset="0"/>
+                        </a:rPr>
+                        <a:t> Hobby Gearmotor</a:t>
+                      </a:r>
+                    </a:p>
+                  </a:txBody>
+                  <a:tcPr marL="6350" marR="6350" marT="6350" marB="0" anchor="b"/>
+                </a:tc>
+                <a:extLst>
+                  <a:ext uri="{0D108BD9-81ED-4DB2-BD59-A6C34878D82A}">
+                    <a16:rowId xmlns:a16="http://schemas.microsoft.com/office/drawing/2014/main" val="2794715135"/>
+                  </a:ext>
+                </a:extLst>
+              </a:tr>
+              <a:tr h="862165">
+                <a:tc>
+                  <a:txBody>
+                    <a:bodyPr/>
+                    <a:lstStyle/>
+                    <a:p>
+                      <a:pPr algn="l" fontAlgn="b"/>
+                      <a:r>
+                        <a:rPr lang="en-IN" sz="1800" b="0" i="0" u="none" strike="noStrike" dirty="0">
+                          <a:solidFill>
+                            <a:srgbClr val="000000"/>
+                          </a:solidFill>
+                          <a:effectLst/>
+                          <a:latin typeface="Times New Roman" panose="02020603050405020304" pitchFamily="18" charset="0"/>
+                          <a:cs typeface="Times New Roman" panose="02020603050405020304" pitchFamily="18" charset="0"/>
+                        </a:rPr>
+                        <a:t>PING1, PING2, PING3, PING4</a:t>
+                      </a:r>
+                    </a:p>
+                  </a:txBody>
+                  <a:tcPr marL="6350" marR="6350" marT="6350" marB="0" anchor="b"/>
+                </a:tc>
+                <a:tc>
+                  <a:txBody>
+                    <a:bodyPr/>
+                    <a:lstStyle/>
+                    <a:p>
+                      <a:pPr algn="ctr" fontAlgn="b"/>
+                      <a:r>
+                        <a:rPr lang="en-IN" sz="1800" b="0" i="0" u="none" strike="noStrike" dirty="0">
+                          <a:solidFill>
+                            <a:srgbClr val="000000"/>
+                          </a:solidFill>
+                          <a:effectLst/>
+                          <a:latin typeface="Times New Roman" panose="02020603050405020304" pitchFamily="18" charset="0"/>
+                          <a:cs typeface="Times New Roman" panose="02020603050405020304" pitchFamily="18" charset="0"/>
+                        </a:rPr>
+                        <a:t>4</a:t>
+                      </a:r>
+                    </a:p>
+                  </a:txBody>
+                  <a:tcPr marL="6350" marR="6350" marT="6350" marB="0" anchor="b"/>
+                </a:tc>
+                <a:tc>
+                  <a:txBody>
+                    <a:bodyPr/>
+                    <a:lstStyle/>
+                    <a:p>
+                      <a:pPr algn="l" fontAlgn="b"/>
+                      <a:r>
+                        <a:rPr lang="en-IN" sz="1800" b="0" i="0" u="none" strike="noStrike">
+                          <a:solidFill>
+                            <a:srgbClr val="000000"/>
+                          </a:solidFill>
+                          <a:effectLst/>
+                          <a:latin typeface="Times New Roman" panose="02020603050405020304" pitchFamily="18" charset="0"/>
+                          <a:cs typeface="Times New Roman" panose="02020603050405020304" pitchFamily="18" charset="0"/>
+                        </a:rPr>
+                        <a:t> Ultrasonic Distance Sensor</a:t>
+                      </a:r>
+                    </a:p>
+                  </a:txBody>
+                  <a:tcPr marL="6350" marR="6350" marT="6350" marB="0" anchor="b"/>
+                </a:tc>
+                <a:extLst>
+                  <a:ext uri="{0D108BD9-81ED-4DB2-BD59-A6C34878D82A}">
+                    <a16:rowId xmlns:a16="http://schemas.microsoft.com/office/drawing/2014/main" val="2485202838"/>
+                  </a:ext>
+                </a:extLst>
+              </a:tr>
+              <a:tr h="576092">
+                <a:tc>
+                  <a:txBody>
+                    <a:bodyPr/>
+                    <a:lstStyle/>
+                    <a:p>
+                      <a:pPr algn="l" fontAlgn="b"/>
+                      <a:r>
+                        <a:rPr lang="en-IN" sz="1800" b="0" i="0" u="none" strike="noStrike">
+                          <a:solidFill>
+                            <a:srgbClr val="000000"/>
+                          </a:solidFill>
+                          <a:effectLst/>
+                          <a:latin typeface="Times New Roman" panose="02020603050405020304" pitchFamily="18" charset="0"/>
+                          <a:cs typeface="Times New Roman" panose="02020603050405020304" pitchFamily="18" charset="0"/>
+                        </a:rPr>
+                        <a:t>U2, U3</a:t>
+                      </a:r>
+                    </a:p>
+                  </a:txBody>
+                  <a:tcPr marL="6350" marR="6350" marT="6350" marB="0" anchor="b"/>
+                </a:tc>
+                <a:tc>
+                  <a:txBody>
+                    <a:bodyPr/>
+                    <a:lstStyle/>
+                    <a:p>
+                      <a:pPr algn="ctr" fontAlgn="b"/>
+                      <a:r>
+                        <a:rPr lang="en-IN" sz="1800" b="0" i="0" u="none" strike="noStrike" dirty="0">
+                          <a:solidFill>
+                            <a:srgbClr val="000000"/>
+                          </a:solidFill>
+                          <a:effectLst/>
+                          <a:latin typeface="Times New Roman" panose="02020603050405020304" pitchFamily="18" charset="0"/>
+                          <a:cs typeface="Times New Roman" panose="02020603050405020304" pitchFamily="18" charset="0"/>
+                        </a:rPr>
+                        <a:t>2</a:t>
+                      </a:r>
+                    </a:p>
+                  </a:txBody>
+                  <a:tcPr marL="6350" marR="6350" marT="6350" marB="0" anchor="b"/>
+                </a:tc>
+                <a:tc>
+                  <a:txBody>
+                    <a:bodyPr/>
+                    <a:lstStyle/>
+                    <a:p>
+                      <a:pPr algn="l" fontAlgn="b"/>
+                      <a:r>
+                        <a:rPr lang="en-IN" sz="1800" b="0" i="0" u="none" strike="noStrike" dirty="0">
+                          <a:solidFill>
+                            <a:srgbClr val="000000"/>
+                          </a:solidFill>
+                          <a:effectLst/>
+                          <a:latin typeface="Times New Roman" panose="02020603050405020304" pitchFamily="18" charset="0"/>
+                          <a:cs typeface="Times New Roman" panose="02020603050405020304" pitchFamily="18" charset="0"/>
+                        </a:rPr>
+                        <a:t> H-bridge Motor Driver</a:t>
+                      </a:r>
+                    </a:p>
+                  </a:txBody>
+                  <a:tcPr marL="6350" marR="6350" marT="6350" marB="0" anchor="b"/>
+                </a:tc>
+                <a:extLst>
+                  <a:ext uri="{0D108BD9-81ED-4DB2-BD59-A6C34878D82A}">
+                    <a16:rowId xmlns:a16="http://schemas.microsoft.com/office/drawing/2014/main" val="3645997678"/>
+                  </a:ext>
+                </a:extLst>
+              </a:tr>
+            </a:tbl>
+          </a:graphicData>
+        </a:graphic>
+      </p:graphicFrame>
+    </p:spTree>
+    <p:extLst>
+      <p:ext uri="{BB962C8B-B14F-4D97-AF65-F5344CB8AC3E}">
+        <p14:creationId xmlns:p14="http://schemas.microsoft.com/office/powerpoint/2010/main" val="962327110"/>
+      </p:ext>
+    </p:extLst>
+  </p:cSld>
+  <p:clrMapOvr>
+    <a:masterClrMapping/>
+  </p:clrMapOvr>
+</p:sld>
+</file>
+
+<file path=ppt/slides/slide4.xml><?xml version="1.0" encoding="utf-8"?>
+<p:sld xmlns:a="http://schemas.openxmlformats.org/drawingml/2006/main" xmlns:r="http://schemas.openxmlformats.org/officeDocument/2006/relationships" xmlns:p="http://schemas.openxmlformats.org/presentationml/2006/main">
+  <p:cSld>
+    <p:spTree>
+      <p:nvGrpSpPr>
+        <p:cNvPr id="1" name=""/>
+        <p:cNvGrpSpPr/>
+        <p:nvPr/>
+      </p:nvGrpSpPr>
+      <p:grpSpPr>
+        <a:xfrm>
+          <a:off x="0" y="0"/>
+          <a:ext cx="0" cy="0"/>
+          <a:chOff x="0" y="0"/>
+          <a:chExt cx="0" cy="0"/>
+        </a:xfrm>
+      </p:grpSpPr>
+      <p:sp>
+        <p:nvSpPr>
+          <p:cNvPr id="2" name="Title 1">
+            <a:extLst>
+              <a:ext uri="{FF2B5EF4-FFF2-40B4-BE49-F238E27FC236}">
+                <a16:creationId xmlns:a16="http://schemas.microsoft.com/office/drawing/2014/main" id="{D044869A-B0DD-4187-91DB-40A2E7E63C3D}"/>
+              </a:ext>
+            </a:extLst>
+          </p:cNvPr>
+          <p:cNvSpPr>
+            <a:spLocks noGrp="1"/>
+          </p:cNvSpPr>
+          <p:nvPr>
+            <p:ph type="title"/>
+          </p:nvPr>
+        </p:nvSpPr>
+        <p:spPr/>
+        <p:txBody>
+          <a:bodyPr/>
+          <a:lstStyle/>
+          <a:p>
+            <a:r>
+              <a:rPr lang="en-IN" dirty="0"/>
+              <a:t>Arduino UNO</a:t>
+            </a:r>
+          </a:p>
+        </p:txBody>
+      </p:sp>
+      <p:sp>
+        <p:nvSpPr>
+          <p:cNvPr id="3" name="Content Placeholder 2">
+            <a:extLst>
+              <a:ext uri="{FF2B5EF4-FFF2-40B4-BE49-F238E27FC236}">
+                <a16:creationId xmlns:a16="http://schemas.microsoft.com/office/drawing/2014/main" id="{3369E541-EF95-465A-B0F7-862D3756C690}"/>
+              </a:ext>
+            </a:extLst>
+          </p:cNvPr>
+          <p:cNvSpPr>
+            <a:spLocks noGrp="1"/>
+          </p:cNvSpPr>
+          <p:nvPr>
+            <p:ph idx="1"/>
+          </p:nvPr>
+        </p:nvSpPr>
+        <p:spPr>
+          <a:xfrm>
+            <a:off x="771524" y="1923069"/>
+            <a:ext cx="6573842" cy="4672201"/>
+          </a:xfrm>
+        </p:spPr>
+        <p:txBody>
+          <a:bodyPr>
+            <a:noAutofit/>
+          </a:bodyPr>
+          <a:lstStyle/>
+          <a:p>
+            <a:r>
+              <a:rPr lang="en-IN" sz="1800" dirty="0">
+                <a:latin typeface="Times New Roman" panose="02020603050405020304" pitchFamily="18" charset="0"/>
+                <a:cs typeface="Times New Roman" panose="02020603050405020304" pitchFamily="18" charset="0"/>
+              </a:rPr>
+              <a:t>Arduino Uno is based on the microcontroller ATmega328P which has a flash memory of 32 kB</a:t>
+            </a:r>
+          </a:p>
+          <a:p>
+            <a:r>
+              <a:rPr lang="en-US" sz="1800" dirty="0">
+                <a:latin typeface="Times New Roman" panose="02020603050405020304" pitchFamily="18" charset="0"/>
+                <a:cs typeface="Times New Roman" panose="02020603050405020304" pitchFamily="18" charset="0"/>
+              </a:rPr>
+              <a:t>The board is equipped with sets of digital and analog input/output (I/O) pins that may be interfaced to various expansion boards (shields) and other circuits</a:t>
+            </a:r>
+            <a:endParaRPr lang="en-US" sz="1800" baseline="30000" dirty="0">
+              <a:latin typeface="Times New Roman" panose="02020603050405020304" pitchFamily="18" charset="0"/>
+              <a:cs typeface="Times New Roman" panose="02020603050405020304" pitchFamily="18" charset="0"/>
+            </a:endParaRPr>
+          </a:p>
+          <a:p>
+            <a:r>
+              <a:rPr lang="en-US" sz="1800" dirty="0">
+                <a:latin typeface="Times New Roman" panose="02020603050405020304" pitchFamily="18" charset="0"/>
+                <a:cs typeface="Times New Roman" panose="02020603050405020304" pitchFamily="18" charset="0"/>
+              </a:rPr>
+              <a:t>The board has 14 digital I/O pins (six capable of PWM output), 6 analog I/O pins, and is programmable with the Arduino IDE ,via a type B USB cable.</a:t>
+            </a:r>
+            <a:endParaRPr lang="en-US" sz="1800" baseline="30000" dirty="0">
+              <a:latin typeface="Times New Roman" panose="02020603050405020304" pitchFamily="18" charset="0"/>
+              <a:cs typeface="Times New Roman" panose="02020603050405020304" pitchFamily="18" charset="0"/>
+            </a:endParaRPr>
+          </a:p>
+          <a:p>
+            <a:r>
+              <a:rPr lang="en-US" sz="1800" dirty="0">
+                <a:latin typeface="Times New Roman" panose="02020603050405020304" pitchFamily="18" charset="0"/>
+                <a:cs typeface="Times New Roman" panose="02020603050405020304" pitchFamily="18" charset="0"/>
+              </a:rPr>
+              <a:t>It can be powered by the USB cable or by an external 9-volt battery, though it accepts voltages between 7 and 20 volts</a:t>
+            </a:r>
+            <a:endParaRPr lang="en-IN" sz="1800" dirty="0">
+              <a:latin typeface="Times New Roman" panose="02020603050405020304" pitchFamily="18" charset="0"/>
+              <a:cs typeface="Times New Roman" panose="02020603050405020304" pitchFamily="18" charset="0"/>
+            </a:endParaRPr>
+          </a:p>
+        </p:txBody>
+      </p:sp>
+      <p:pic>
+        <p:nvPicPr>
+          <p:cNvPr id="5" name="Picture 4">
+            <a:extLst>
+              <a:ext uri="{FF2B5EF4-FFF2-40B4-BE49-F238E27FC236}">
+                <a16:creationId xmlns:a16="http://schemas.microsoft.com/office/drawing/2014/main" id="{CA862EBD-BB3F-4435-B8FF-15BF1DD515CD}"/>
+              </a:ext>
+            </a:extLst>
+          </p:cNvPr>
+          <p:cNvPicPr>
+            <a:picLocks noChangeAspect="1"/>
+          </p:cNvPicPr>
+          <p:nvPr/>
+        </p:nvPicPr>
+        <p:blipFill>
+          <a:blip r:embed="rId3"/>
+          <a:stretch>
+            <a:fillRect/>
+          </a:stretch>
+        </p:blipFill>
+        <p:spPr>
+          <a:xfrm>
+            <a:off x="7505701" y="1923069"/>
+            <a:ext cx="3457575" cy="3457575"/>
+          </a:xfrm>
+          <a:prstGeom prst="rect">
+            <a:avLst/>
+          </a:prstGeom>
+        </p:spPr>
+      </p:pic>
+    </p:spTree>
+    <p:custDataLst>
+      <p:tags r:id="rId1"/>
+    </p:custDataLst>
+    <p:extLst>
+      <p:ext uri="{BB962C8B-B14F-4D97-AF65-F5344CB8AC3E}">
+        <p14:creationId xmlns:p14="http://schemas.microsoft.com/office/powerpoint/2010/main" val="2012055216"/>
+      </p:ext>
+    </p:extLst>
+  </p:cSld>
+  <p:clrMapOvr>
+    <a:masterClrMapping/>
+  </p:clrMapOvr>
+  <p:timing>
+    <p:tnLst>
+      <p:par>
+        <p:cTn id="1" dur="indefinite" restart="never" nodeType="tmRoot">
+          <p:childTnLst>
+            <p:seq concurrent="1" nextAc="seek">
+              <p:cTn id="2" dur="indefinite" nodeType="mainSeq">
+                <p:childTnLst>
+                  <p:par>
+                    <p:cTn id="3" fill="hold">
+                      <p:stCondLst>
+                        <p:cond delay="indefinite"/>
+                      </p:stCondLst>
+                      <p:childTnLst>
+                        <p:par>
+                          <p:cTn id="4" fill="hold">
+                            <p:stCondLst>
+                              <p:cond delay="0"/>
+                            </p:stCondLst>
+                            <p:childTnLst>
+                              <p:par>
+                                <p:cTn id="5" presetID="22" presetClass="entr" presetSubtype="4" fill="hold" nodeType="clickEffect">
+                                  <p:stCondLst>
+                                    <p:cond delay="0"/>
+                                  </p:stCondLst>
+                                  <p:childTnLst>
+                                    <p:set>
+                                      <p:cBhvr>
+                                        <p:cTn id="6" dur="1" fill="hold">
+                                          <p:stCondLst>
+                                            <p:cond delay="0"/>
+                                          </p:stCondLst>
+                                        </p:cTn>
+                                        <p:tgtEl>
+                                          <p:spTgt spid="5"/>
+                                        </p:tgtEl>
+                                        <p:attrNameLst>
+                                          <p:attrName>style.visibility</p:attrName>
+                                        </p:attrNameLst>
+                                      </p:cBhvr>
+                                      <p:to>
+                                        <p:strVal val="visible"/>
+                                      </p:to>
+                                    </p:set>
+                                    <p:animEffect transition="in" filter="wipe(down)">
+                                      <p:cBhvr>
+                                        <p:cTn id="7" dur="500"/>
+                                        <p:tgtEl>
+                                          <p:spTgt spid="5"/>
+                                        </p:tgtEl>
+                                      </p:cBhvr>
+                                    </p:animEffect>
+                                  </p:childTnLst>
+                                </p:cTn>
+                              </p:par>
+                            </p:childTnLst>
+                          </p:cTn>
+                        </p:par>
+                      </p:childTnLst>
+                    </p:cTn>
+                  </p:par>
+                  <p:par>
+                    <p:cTn id="8" fill="hold">
+                      <p:stCondLst>
+                        <p:cond delay="indefinite"/>
+                      </p:stCondLst>
+                      <p:childTnLst>
+                        <p:par>
+                          <p:cTn id="9" fill="hold">
+                            <p:stCondLst>
+                              <p:cond delay="0"/>
+                            </p:stCondLst>
+                            <p:childTnLst>
+                              <p:par>
+                                <p:cTn id="10" presetID="10" presetClass="entr" presetSubtype="0" fill="hold" grpId="0" nodeType="clickEffect">
+                                  <p:stCondLst>
+                                    <p:cond delay="0"/>
+                                  </p:stCondLst>
+                                  <p:childTnLst>
+                                    <p:set>
+                                      <p:cBhvr>
+                                        <p:cTn id="11" dur="1" fill="hold">
+                                          <p:stCondLst>
+                                            <p:cond delay="0"/>
+                                          </p:stCondLst>
+                                        </p:cTn>
+                                        <p:tgtEl>
+                                          <p:spTgt spid="3">
+                                            <p:txEl>
+                                              <p:pRg st="0" end="0"/>
+                                            </p:txEl>
+                                          </p:spTgt>
+                                        </p:tgtEl>
+                                        <p:attrNameLst>
+                                          <p:attrName>style.visibility</p:attrName>
+                                        </p:attrNameLst>
+                                      </p:cBhvr>
+                                      <p:to>
+                                        <p:strVal val="visible"/>
+                                      </p:to>
+                                    </p:set>
+                                    <p:animEffect transition="in" filter="fade">
+                                      <p:cBhvr>
+                                        <p:cTn id="12" dur="500"/>
+                                        <p:tgtEl>
+                                          <p:spTgt spid="3">
+                                            <p:txEl>
+                                              <p:pRg st="0" end="0"/>
+                                            </p:txEl>
+                                          </p:spTgt>
+                                        </p:tgtEl>
+                                      </p:cBhvr>
+                                    </p:animEffect>
+                                  </p:childTnLst>
+                                </p:cTn>
+                              </p:par>
+                            </p:childTnLst>
+                          </p:cTn>
+                        </p:par>
+                      </p:childTnLst>
+                    </p:cTn>
+                  </p:par>
+                  <p:par>
+                    <p:cTn id="13" fill="hold">
+                      <p:stCondLst>
+                        <p:cond delay="indefinite"/>
+                      </p:stCondLst>
+                      <p:childTnLst>
+                        <p:par>
+                          <p:cTn id="14" fill="hold">
+                            <p:stCondLst>
+                              <p:cond delay="0"/>
+                            </p:stCondLst>
+                            <p:childTnLst>
+                              <p:par>
+                                <p:cTn id="15" presetID="10" presetClass="entr" presetSubtype="0" fill="hold" grpId="0" nodeType="clickEffect">
+                                  <p:stCondLst>
+                                    <p:cond delay="0"/>
+                                  </p:stCondLst>
+                                  <p:childTnLst>
+                                    <p:set>
+                                      <p:cBhvr>
+                                        <p:cTn id="16" dur="1" fill="hold">
+                                          <p:stCondLst>
+                                            <p:cond delay="0"/>
+                                          </p:stCondLst>
+                                        </p:cTn>
+                                        <p:tgtEl>
+                                          <p:spTgt spid="3">
+                                            <p:txEl>
+                                              <p:pRg st="1" end="1"/>
+                                            </p:txEl>
+                                          </p:spTgt>
+                                        </p:tgtEl>
+                                        <p:attrNameLst>
+                                          <p:attrName>style.visibility</p:attrName>
+                                        </p:attrNameLst>
+                                      </p:cBhvr>
+                                      <p:to>
+                                        <p:strVal val="visible"/>
+                                      </p:to>
+                                    </p:set>
+                                    <p:animEffect transition="in" filter="fade">
+                                      <p:cBhvr>
+                                        <p:cTn id="17" dur="500"/>
+                                        <p:tgtEl>
+                                          <p:spTgt spid="3">
+                                            <p:txEl>
+                                              <p:pRg st="1" end="1"/>
+                                            </p:txEl>
+                                          </p:spTgt>
+                                        </p:tgtEl>
+                                      </p:cBhvr>
+                                    </p:animEffect>
+                                  </p:childTnLst>
+                                </p:cTn>
+                              </p:par>
+                            </p:childTnLst>
+                          </p:cTn>
+                        </p:par>
+                      </p:childTnLst>
+                    </p:cTn>
+                  </p:par>
+                  <p:par>
+                    <p:cTn id="18" fill="hold">
+                      <p:stCondLst>
+                        <p:cond delay="indefinite"/>
+                      </p:stCondLst>
+                      <p:childTnLst>
+                        <p:par>
+                          <p:cTn id="19" fill="hold">
+                            <p:stCondLst>
+                              <p:cond delay="0"/>
+                            </p:stCondLst>
+                            <p:childTnLst>
+                              <p:par>
+                                <p:cTn id="20" presetID="10" presetClass="entr" presetSubtype="0" fill="hold" grpId="0" nodeType="clickEffect">
+                                  <p:stCondLst>
+                                    <p:cond delay="0"/>
+                                  </p:stCondLst>
+                                  <p:childTnLst>
+                                    <p:set>
+                                      <p:cBhvr>
+                                        <p:cTn id="21" dur="1" fill="hold">
+                                          <p:stCondLst>
+                                            <p:cond delay="0"/>
+                                          </p:stCondLst>
+                                        </p:cTn>
+                                        <p:tgtEl>
+                                          <p:spTgt spid="3">
+                                            <p:txEl>
+                                              <p:pRg st="2" end="2"/>
+                                            </p:txEl>
+                                          </p:spTgt>
+                                        </p:tgtEl>
+                                        <p:attrNameLst>
+                                          <p:attrName>style.visibility</p:attrName>
+                                        </p:attrNameLst>
+                                      </p:cBhvr>
+                                      <p:to>
+                                        <p:strVal val="visible"/>
+                                      </p:to>
+                                    </p:set>
+                                    <p:animEffect transition="in" filter="fade">
+                                      <p:cBhvr>
+                                        <p:cTn id="22" dur="500"/>
+                                        <p:tgtEl>
+                                          <p:spTgt spid="3">
+                                            <p:txEl>
+                                              <p:pRg st="2" end="2"/>
+                                            </p:txEl>
+                                          </p:spTgt>
+                                        </p:tgtEl>
+                                      </p:cBhvr>
+                                    </p:animEffect>
+                                  </p:childTnLst>
+                                </p:cTn>
+                              </p:par>
+                            </p:childTnLst>
+                          </p:cTn>
+                        </p:par>
+                      </p:childTnLst>
+                    </p:cTn>
+                  </p:par>
+                  <p:par>
+                    <p:cTn id="23" fill="hold">
+                      <p:stCondLst>
+                        <p:cond delay="indefinite"/>
+                      </p:stCondLst>
+                      <p:childTnLst>
+                        <p:par>
+                          <p:cTn id="24" fill="hold">
+                            <p:stCondLst>
+                              <p:cond delay="0"/>
+                            </p:stCondLst>
+                            <p:childTnLst>
+                              <p:par>
+                                <p:cTn id="25" presetID="10" presetClass="entr" presetSubtype="0" fill="hold" grpId="0" nodeType="clickEffect">
+                                  <p:stCondLst>
+                                    <p:cond delay="0"/>
+                                  </p:stCondLst>
+                                  <p:childTnLst>
+                                    <p:set>
+                                      <p:cBhvr>
+                                        <p:cTn id="26" dur="1" fill="hold">
+                                          <p:stCondLst>
+                                            <p:cond delay="0"/>
+                                          </p:stCondLst>
+                                        </p:cTn>
+                                        <p:tgtEl>
+                                          <p:spTgt spid="3">
+                                            <p:txEl>
+                                              <p:pRg st="3" end="3"/>
+                                            </p:txEl>
+                                          </p:spTgt>
+                                        </p:tgtEl>
+                                        <p:attrNameLst>
+                                          <p:attrName>style.visibility</p:attrName>
+                                        </p:attrNameLst>
+                                      </p:cBhvr>
+                                      <p:to>
+                                        <p:strVal val="visible"/>
+                                      </p:to>
+                                    </p:set>
+                                    <p:animEffect transition="in" filter="fade">
+                                      <p:cBhvr>
+                                        <p:cTn id="27" dur="500"/>
+                                        <p:tgtEl>
+                                          <p:spTgt spid="3">
+                                            <p:txEl>
+                                              <p:pRg st="3" end="3"/>
+                                            </p:txEl>
+                                          </p:spTgt>
+                                        </p:tgtEl>
+                                      </p:cBhvr>
+                                    </p:animEffect>
+                                  </p:childTnLst>
+                                </p:cTn>
+                              </p:par>
+                            </p:childTnLst>
+                          </p:cTn>
+                        </p:par>
+                      </p:childTnLst>
+                    </p:cTn>
+                  </p:par>
+                </p:childTnLst>
+              </p:cTn>
+              <p:prevCondLst>
+                <p:cond evt="onPrev" delay="0">
+                  <p:tgtEl>
+                    <p:sldTgt/>
+                  </p:tgtEl>
+                </p:cond>
+              </p:prevCondLst>
+              <p:nextCondLst>
+                <p:cond evt="onNext" delay="0">
+                  <p:tgtEl>
+                    <p:sldTgt/>
+                  </p:tgtEl>
+                </p:cond>
+              </p:nextCondLst>
+            </p:seq>
+          </p:childTnLst>
+        </p:cTn>
+      </p:par>
+    </p:tnLst>
+    <p:bldLst>
+      <p:bldP spid="3" grpId="0" build="p"/>
+    </p:bldLst>
+  </p:timing>
+</p:sld>
+</file>
+
+<file path=ppt/slides/slide5.xml><?xml version="1.0" encoding="utf-8"?>
+<p:sld xmlns:a="http://schemas.openxmlformats.org/drawingml/2006/main" xmlns:r="http://schemas.openxmlformats.org/officeDocument/2006/relationships" xmlns:p="http://schemas.openxmlformats.org/presentationml/2006/main">
+  <p:cSld>
+    <p:spTree>
+      <p:nvGrpSpPr>
+        <p:cNvPr id="1" name=""/>
+        <p:cNvGrpSpPr/>
+        <p:nvPr/>
+      </p:nvGrpSpPr>
+      <p:grpSpPr>
+        <a:xfrm>
+          <a:off x="0" y="0"/>
+          <a:ext cx="0" cy="0"/>
+          <a:chOff x="0" y="0"/>
+          <a:chExt cx="0" cy="0"/>
+        </a:xfrm>
+      </p:grpSpPr>
+      <p:sp>
+        <p:nvSpPr>
+          <p:cNvPr id="2" name="Title 1">
+            <a:extLst>
+              <a:ext uri="{FF2B5EF4-FFF2-40B4-BE49-F238E27FC236}">
+                <a16:creationId xmlns:a16="http://schemas.microsoft.com/office/drawing/2014/main" id="{2340C822-548F-4F2C-868D-9E924CA4C3DF}"/>
+              </a:ext>
+            </a:extLst>
+          </p:cNvPr>
+          <p:cNvSpPr>
+            <a:spLocks noGrp="1"/>
+          </p:cNvSpPr>
+          <p:nvPr>
+            <p:ph type="title"/>
+          </p:nvPr>
+        </p:nvSpPr>
+        <p:spPr/>
+        <p:txBody>
+          <a:bodyPr/>
+          <a:lstStyle/>
+          <a:p>
+            <a:r>
+              <a:rPr lang="en-IN" dirty="0"/>
+              <a:t>Ultrasonic sensor</a:t>
+            </a:r>
+          </a:p>
+        </p:txBody>
+      </p:sp>
+      <p:sp>
+        <p:nvSpPr>
+          <p:cNvPr id="3" name="Content Placeholder 2">
+            <a:extLst>
+              <a:ext uri="{FF2B5EF4-FFF2-40B4-BE49-F238E27FC236}">
+                <a16:creationId xmlns:a16="http://schemas.microsoft.com/office/drawing/2014/main" id="{86171FAB-B25B-40AD-8CFE-5082B5A3B303}"/>
+              </a:ext>
+            </a:extLst>
+          </p:cNvPr>
+          <p:cNvSpPr>
+            <a:spLocks noGrp="1"/>
+          </p:cNvSpPr>
+          <p:nvPr>
+            <p:ph idx="1"/>
+          </p:nvPr>
+        </p:nvSpPr>
+        <p:spPr>
+          <a:xfrm>
+            <a:off x="1141413" y="2250094"/>
+            <a:ext cx="5489577" cy="3989388"/>
+          </a:xfrm>
+        </p:spPr>
+        <p:txBody>
+          <a:bodyPr>
+            <a:noAutofit/>
+          </a:bodyPr>
+          <a:lstStyle/>
+          <a:p>
+            <a:r>
+              <a:rPr lang="en-US" altLang="en-US" sz="1800" dirty="0">
+                <a:latin typeface="Times New Roman" panose="02020603050405020304" pitchFamily="18" charset="0"/>
+                <a:ea typeface="Calibri" panose="020F0502020204030204" pitchFamily="34" charset="0"/>
+                <a:cs typeface="Times New Roman" panose="02020603050405020304" pitchFamily="18" charset="0"/>
+              </a:rPr>
+              <a:t>Short range distance sensor</a:t>
+            </a:r>
+          </a:p>
+          <a:p>
+            <a:r>
+              <a:rPr lang="en-US" altLang="en-US" sz="1800" dirty="0">
+                <a:latin typeface="Times New Roman" panose="02020603050405020304" pitchFamily="18" charset="0"/>
+                <a:ea typeface="Calibri" panose="020F0502020204030204" pitchFamily="34" charset="0"/>
+                <a:cs typeface="Times New Roman" panose="02020603050405020304" pitchFamily="18" charset="0"/>
+              </a:rPr>
+              <a:t>Ultrasonic sensors measure distance by transmitting pulses of ultrasonic sound-waves which propagates through the air</a:t>
+            </a:r>
+          </a:p>
+          <a:p>
+            <a:r>
+              <a:rPr lang="en-US" altLang="en-US" sz="1800" dirty="0">
+                <a:latin typeface="Times New Roman" panose="02020603050405020304" pitchFamily="18" charset="0"/>
+                <a:ea typeface="Calibri" panose="020F0502020204030204" pitchFamily="34" charset="0"/>
+                <a:cs typeface="Times New Roman" panose="02020603050405020304" pitchFamily="18" charset="0"/>
+              </a:rPr>
+              <a:t>If there is an object in front of the sensor, the sound-waves reflects and returns to the receiver</a:t>
+            </a:r>
+          </a:p>
+          <a:p>
+            <a:r>
+              <a:rPr lang="en-US" altLang="en-US" sz="1800" dirty="0">
+                <a:latin typeface="Times New Roman" panose="02020603050405020304" pitchFamily="18" charset="0"/>
+                <a:ea typeface="Calibri" panose="020F0502020204030204" pitchFamily="34" charset="0"/>
+                <a:cs typeface="Times New Roman" panose="02020603050405020304" pitchFamily="18" charset="0"/>
+              </a:rPr>
+              <a:t>Reflected wave is received by the sensor when there is an object in front of them</a:t>
+            </a:r>
+          </a:p>
+        </p:txBody>
+      </p:sp>
+      <p:pic>
+        <p:nvPicPr>
+          <p:cNvPr id="9" name="Picture 8">
+            <a:extLst>
+              <a:ext uri="{FF2B5EF4-FFF2-40B4-BE49-F238E27FC236}">
+                <a16:creationId xmlns:a16="http://schemas.microsoft.com/office/drawing/2014/main" id="{F29F1CF5-C463-4068-ABE2-97699F63ADC0}"/>
+              </a:ext>
+            </a:extLst>
+          </p:cNvPr>
+          <p:cNvPicPr>
+            <a:picLocks noChangeAspect="1"/>
+          </p:cNvPicPr>
+          <p:nvPr/>
+        </p:nvPicPr>
+        <p:blipFill>
+          <a:blip r:embed="rId3"/>
+          <a:stretch>
+            <a:fillRect/>
+          </a:stretch>
+        </p:blipFill>
+        <p:spPr>
+          <a:xfrm>
+            <a:off x="7210425" y="2097088"/>
+            <a:ext cx="3257551" cy="3257551"/>
+          </a:xfrm>
+          <a:prstGeom prst="rect">
+            <a:avLst/>
+          </a:prstGeom>
+        </p:spPr>
+      </p:pic>
+    </p:spTree>
+    <p:custDataLst>
+      <p:tags r:id="rId1"/>
+    </p:custDataLst>
+    <p:extLst>
+      <p:ext uri="{BB962C8B-B14F-4D97-AF65-F5344CB8AC3E}">
+        <p14:creationId xmlns:p14="http://schemas.microsoft.com/office/powerpoint/2010/main" val="4272228729"/>
+      </p:ext>
+    </p:extLst>
+  </p:cSld>
+  <p:clrMapOvr>
+    <a:masterClrMapping/>
+  </p:clrMapOvr>
+  <p:timing>
+    <p:tnLst>
+      <p:par>
+        <p:cTn id="1" dur="indefinite" restart="never" nodeType="tmRoot">
+          <p:childTnLst>
+            <p:seq concurrent="1" nextAc="seek">
+              <p:cTn id="2" dur="indefinite" nodeType="mainSeq">
+                <p:childTnLst>
+                  <p:par>
+                    <p:cTn id="3" fill="hold">
+                      <p:stCondLst>
+                        <p:cond delay="indefinite"/>
+                      </p:stCondLst>
+                      <p:childTnLst>
+                        <p:par>
+                          <p:cTn id="4" fill="hold">
+                            <p:stCondLst>
+                              <p:cond delay="0"/>
+                            </p:stCondLst>
+                            <p:childTnLst>
+                              <p:par>
+                                <p:cTn id="5" presetID="1" presetClass="entr" presetSubtype="0" fill="hold" nodeType="clickEffect">
+                                  <p:stCondLst>
+                                    <p:cond delay="0"/>
+                                  </p:stCondLst>
+                                  <p:childTnLst>
+                                    <p:set>
+                                      <p:cBhvr>
+                                        <p:cTn id="6" dur="1" fill="hold">
+                                          <p:stCondLst>
+                                            <p:cond delay="0"/>
+                                          </p:stCondLst>
+                                        </p:cTn>
+                                        <p:tgtEl>
+                                          <p:spTgt spid="9"/>
+                                        </p:tgtEl>
+                                        <p:attrNameLst>
+                                          <p:attrName>style.visibility</p:attrName>
+                                        </p:attrNameLst>
+                                      </p:cBhvr>
+                                      <p:to>
+                                        <p:strVal val="visible"/>
+                                      </p:to>
+                                    </p:set>
+                                  </p:childTnLst>
+                                </p:cTn>
+                              </p:par>
+                            </p:childTnLst>
+                          </p:cTn>
+                        </p:par>
+                      </p:childTnLst>
+                    </p:cTn>
+                  </p:par>
+                  <p:par>
+                    <p:cTn id="7" fill="hold">
+                      <p:stCondLst>
+                        <p:cond delay="indefinite"/>
+                      </p:stCondLst>
+                      <p:childTnLst>
+                        <p:par>
+                          <p:cTn id="8" fill="hold">
+                            <p:stCondLst>
+                              <p:cond delay="0"/>
+                            </p:stCondLst>
+                            <p:childTnLst>
+                              <p:par>
+                                <p:cTn id="9" presetID="22" presetClass="entr" presetSubtype="4" fill="hold" grpId="0" nodeType="clickEffect">
+                                  <p:stCondLst>
+                                    <p:cond delay="0"/>
+                                  </p:stCondLst>
+                                  <p:childTnLst>
+                                    <p:set>
+                                      <p:cBhvr>
+                                        <p:cTn id="10" dur="1" fill="hold">
+                                          <p:stCondLst>
+                                            <p:cond delay="0"/>
+                                          </p:stCondLst>
+                                        </p:cTn>
+                                        <p:tgtEl>
+                                          <p:spTgt spid="3">
+                                            <p:txEl>
+                                              <p:pRg st="0" end="0"/>
+                                            </p:txEl>
+                                          </p:spTgt>
+                                        </p:tgtEl>
+                                        <p:attrNameLst>
+                                          <p:attrName>style.visibility</p:attrName>
+                                        </p:attrNameLst>
+                                      </p:cBhvr>
+                                      <p:to>
+                                        <p:strVal val="visible"/>
+                                      </p:to>
+                                    </p:set>
+                                    <p:animEffect transition="in" filter="wipe(down)">
+                                      <p:cBhvr>
+                                        <p:cTn id="11" dur="500"/>
+                                        <p:tgtEl>
+                                          <p:spTgt spid="3">
+                                            <p:txEl>
+                                              <p:pRg st="0" end="0"/>
+                                            </p:txEl>
+                                          </p:spTgt>
+                                        </p:tgtEl>
+                                      </p:cBhvr>
+                                    </p:animEffect>
+                                  </p:childTnLst>
+                                </p:cTn>
+                              </p:par>
+                            </p:childTnLst>
+                          </p:cTn>
+                        </p:par>
+                      </p:childTnLst>
+                    </p:cTn>
+                  </p:par>
+                  <p:par>
+                    <p:cTn id="12" fill="hold">
+                      <p:stCondLst>
+                        <p:cond delay="indefinite"/>
+                      </p:stCondLst>
+                      <p:childTnLst>
+                        <p:par>
+                          <p:cTn id="13" fill="hold">
+                            <p:stCondLst>
+                              <p:cond delay="0"/>
+                            </p:stCondLst>
+                            <p:childTnLst>
+                              <p:par>
+                                <p:cTn id="14" presetID="22" presetClass="entr" presetSubtype="4" fill="hold" grpId="0" nodeType="clickEffect">
+                                  <p:stCondLst>
+                                    <p:cond delay="0"/>
+                                  </p:stCondLst>
+                                  <p:childTnLst>
+                                    <p:set>
+                                      <p:cBhvr>
+                                        <p:cTn id="15" dur="1" fill="hold">
+                                          <p:stCondLst>
+                                            <p:cond delay="0"/>
+                                          </p:stCondLst>
+                                        </p:cTn>
+                                        <p:tgtEl>
+                                          <p:spTgt spid="3">
+                                            <p:txEl>
+                                              <p:pRg st="1" end="1"/>
+                                            </p:txEl>
+                                          </p:spTgt>
+                                        </p:tgtEl>
+                                        <p:attrNameLst>
+                                          <p:attrName>style.visibility</p:attrName>
+                                        </p:attrNameLst>
+                                      </p:cBhvr>
+                                      <p:to>
+                                        <p:strVal val="visible"/>
+                                      </p:to>
+                                    </p:set>
+                                    <p:animEffect transition="in" filter="wipe(down)">
+                                      <p:cBhvr>
+                                        <p:cTn id="16" dur="500"/>
+                                        <p:tgtEl>
+                                          <p:spTgt spid="3">
+                                            <p:txEl>
+                                              <p:pRg st="1" end="1"/>
+                                            </p:txEl>
+                                          </p:spTgt>
+                                        </p:tgtEl>
+                                      </p:cBhvr>
+                                    </p:animEffect>
+                                  </p:childTnLst>
+                                </p:cTn>
+                              </p:par>
+                            </p:childTnLst>
+                          </p:cTn>
+                        </p:par>
+                      </p:childTnLst>
+                    </p:cTn>
+                  </p:par>
+                  <p:par>
+                    <p:cTn id="17" fill="hold">
+                      <p:stCondLst>
+                        <p:cond delay="indefinite"/>
+                      </p:stCondLst>
+                      <p:childTnLst>
+                        <p:par>
+                          <p:cTn id="18" fill="hold">
+                            <p:stCondLst>
+                              <p:cond delay="0"/>
+                            </p:stCondLst>
+                            <p:childTnLst>
+                              <p:par>
+                                <p:cTn id="19" presetID="22" presetClass="entr" presetSubtype="4" fill="hold" grpId="0" nodeType="clickEffect">
+                                  <p:stCondLst>
+                                    <p:cond delay="0"/>
+                                  </p:stCondLst>
+                                  <p:childTnLst>
+                                    <p:set>
+                                      <p:cBhvr>
+                                        <p:cTn id="20" dur="1" fill="hold">
+                                          <p:stCondLst>
+                                            <p:cond delay="0"/>
+                                          </p:stCondLst>
+                                        </p:cTn>
+                                        <p:tgtEl>
+                                          <p:spTgt spid="3">
+                                            <p:txEl>
+                                              <p:pRg st="2" end="2"/>
+                                            </p:txEl>
+                                          </p:spTgt>
+                                        </p:tgtEl>
+                                        <p:attrNameLst>
+                                          <p:attrName>style.visibility</p:attrName>
+                                        </p:attrNameLst>
+                                      </p:cBhvr>
+                                      <p:to>
+                                        <p:strVal val="visible"/>
+                                      </p:to>
+                                    </p:set>
+                                    <p:animEffect transition="in" filter="wipe(down)">
+                                      <p:cBhvr>
+                                        <p:cTn id="21" dur="500"/>
+                                        <p:tgtEl>
+                                          <p:spTgt spid="3">
+                                            <p:txEl>
+                                              <p:pRg st="2" end="2"/>
+                                            </p:txEl>
+                                          </p:spTgt>
+                                        </p:tgtEl>
+                                      </p:cBhvr>
+                                    </p:animEffect>
+                                  </p:childTnLst>
+                                </p:cTn>
+                              </p:par>
+                            </p:childTnLst>
+                          </p:cTn>
+                        </p:par>
+                      </p:childTnLst>
+                    </p:cTn>
+                  </p:par>
+                  <p:par>
+                    <p:cTn id="22" fill="hold">
+                      <p:stCondLst>
+                        <p:cond delay="indefinite"/>
+                      </p:stCondLst>
+                      <p:childTnLst>
+                        <p:par>
+                          <p:cTn id="23" fill="hold">
+                            <p:stCondLst>
+                              <p:cond delay="0"/>
+                            </p:stCondLst>
+                            <p:childTnLst>
+                              <p:par>
+                                <p:cTn id="24" presetID="22" presetClass="entr" presetSubtype="4" fill="hold" grpId="0" nodeType="clickEffect">
+                                  <p:stCondLst>
+                                    <p:cond delay="0"/>
+                                  </p:stCondLst>
+                                  <p:childTnLst>
+                                    <p:set>
+                                      <p:cBhvr>
+                                        <p:cTn id="25" dur="1" fill="hold">
+                                          <p:stCondLst>
+                                            <p:cond delay="0"/>
+                                          </p:stCondLst>
+                                        </p:cTn>
+                                        <p:tgtEl>
+                                          <p:spTgt spid="3">
+                                            <p:txEl>
+                                              <p:pRg st="3" end="3"/>
+                                            </p:txEl>
+                                          </p:spTgt>
+                                        </p:tgtEl>
+                                        <p:attrNameLst>
+                                          <p:attrName>style.visibility</p:attrName>
+                                        </p:attrNameLst>
+                                      </p:cBhvr>
+                                      <p:to>
+                                        <p:strVal val="visible"/>
+                                      </p:to>
+                                    </p:set>
+                                    <p:animEffect transition="in" filter="wipe(down)">
+                                      <p:cBhvr>
+                                        <p:cTn id="26" dur="500"/>
+                                        <p:tgtEl>
+                                          <p:spTgt spid="3">
+                                            <p:txEl>
+                                              <p:pRg st="3" end="3"/>
+                                            </p:txEl>
+                                          </p:spTgt>
+                                        </p:tgtEl>
+                                      </p:cBhvr>
+                                    </p:animEffect>
+                                  </p:childTnLst>
+                                </p:cTn>
+                              </p:par>
+                            </p:childTnLst>
+                          </p:cTn>
+                        </p:par>
+                      </p:childTnLst>
+                    </p:cTn>
+                  </p:par>
+                </p:childTnLst>
+              </p:cTn>
+              <p:prevCondLst>
+                <p:cond evt="onPrev" delay="0">
+                  <p:tgtEl>
+                    <p:sldTgt/>
+                  </p:tgtEl>
+                </p:cond>
+              </p:prevCondLst>
+              <p:nextCondLst>
+                <p:cond evt="onNext" delay="0">
+                  <p:tgtEl>
+                    <p:sldTgt/>
+                  </p:tgtEl>
+                </p:cond>
+              </p:nextCondLst>
+            </p:seq>
+          </p:childTnLst>
+        </p:cTn>
+      </p:par>
+    </p:tnLst>
+    <p:bldLst>
+      <p:bldP spid="3" grpId="0" build="p"/>
+    </p:bldLst>
+  </p:timing>
+</p:sld>
+</file>
+
+<file path=ppt/slides/slide6.xml><?xml version="1.0" encoding="utf-8"?>
+<p:sld xmlns:a="http://schemas.openxmlformats.org/drawingml/2006/main" xmlns:r="http://schemas.openxmlformats.org/officeDocument/2006/relationships" xmlns:p="http://schemas.openxmlformats.org/presentationml/2006/main">
+  <p:cSld>
+    <p:spTree>
+      <p:nvGrpSpPr>
+        <p:cNvPr id="1" name=""/>
+        <p:cNvGrpSpPr/>
+        <p:nvPr/>
+      </p:nvGrpSpPr>
+      <p:grpSpPr>
+        <a:xfrm>
+          <a:off x="0" y="0"/>
+          <a:ext cx="0" cy="0"/>
+          <a:chOff x="0" y="0"/>
+          <a:chExt cx="0" cy="0"/>
+        </a:xfrm>
+      </p:grpSpPr>
+      <p:sp>
+        <p:nvSpPr>
+          <p:cNvPr id="2" name="Title 1">
+            <a:extLst>
+              <a:ext uri="{FF2B5EF4-FFF2-40B4-BE49-F238E27FC236}">
+                <a16:creationId xmlns:a16="http://schemas.microsoft.com/office/drawing/2014/main" id="{F80CE48C-9907-43D8-A079-8FFFDACF842B}"/>
+              </a:ext>
+            </a:extLst>
+          </p:cNvPr>
+          <p:cNvSpPr>
+            <a:spLocks noGrp="1"/>
+          </p:cNvSpPr>
+          <p:nvPr>
+            <p:ph type="title"/>
+          </p:nvPr>
+        </p:nvSpPr>
+        <p:spPr/>
+        <p:txBody>
+          <a:bodyPr/>
+          <a:lstStyle/>
+          <a:p>
+            <a:r>
+              <a:rPr lang="en-IN" dirty="0"/>
+              <a:t>DC motor with gear drive</a:t>
+            </a:r>
+          </a:p>
+        </p:txBody>
+      </p:sp>
+      <p:sp>
+        <p:nvSpPr>
+          <p:cNvPr id="3" name="Content Placeholder 2">
+            <a:extLst>
+              <a:ext uri="{FF2B5EF4-FFF2-40B4-BE49-F238E27FC236}">
+                <a16:creationId xmlns:a16="http://schemas.microsoft.com/office/drawing/2014/main" id="{BE1E147A-AC47-482D-B839-0808C5419FEB}"/>
+              </a:ext>
+            </a:extLst>
+          </p:cNvPr>
+          <p:cNvSpPr>
+            <a:spLocks noGrp="1"/>
+          </p:cNvSpPr>
+          <p:nvPr>
+            <p:ph idx="1"/>
+          </p:nvPr>
+        </p:nvSpPr>
+        <p:spPr>
+          <a:xfrm>
+            <a:off x="1085057" y="1888144"/>
+            <a:ext cx="6345237" cy="4351338"/>
+          </a:xfrm>
+        </p:spPr>
+        <p:txBody>
+          <a:bodyPr>
+            <a:noAutofit/>
+          </a:bodyPr>
+          <a:lstStyle/>
+          <a:p>
+            <a:r>
+              <a:rPr lang="en-IN" sz="1800" dirty="0">
+                <a:latin typeface="Times New Roman" panose="02020603050405020304" pitchFamily="18" charset="0"/>
+                <a:cs typeface="Times New Roman" panose="02020603050405020304" pitchFamily="18" charset="0"/>
+              </a:rPr>
+              <a:t>DC motors are those class of rotary electrical motors that converts direct current (DC) electrical energy into mechanical energy</a:t>
+            </a:r>
+          </a:p>
+          <a:p>
+            <a:r>
+              <a:rPr lang="en-US" sz="1800" dirty="0">
+                <a:latin typeface="Times New Roman" panose="02020603050405020304" pitchFamily="18" charset="0"/>
+                <a:cs typeface="Times New Roman" panose="02020603050405020304" pitchFamily="18" charset="0"/>
+              </a:rPr>
+              <a:t>Parts are armature, stator</a:t>
+            </a:r>
+          </a:p>
+          <a:p>
+            <a:r>
+              <a:rPr lang="en-US" sz="1800" dirty="0">
+                <a:latin typeface="Times New Roman" panose="02020603050405020304" pitchFamily="18" charset="0"/>
+                <a:cs typeface="Times New Roman" panose="02020603050405020304" pitchFamily="18" charset="0"/>
+              </a:rPr>
+              <a:t>The rotating part is the armature which is connected to the DC supply and stator is a stationary part</a:t>
+            </a:r>
+          </a:p>
+          <a:p>
+            <a:r>
+              <a:rPr lang="en-US" sz="1800" dirty="0">
+                <a:latin typeface="Times New Roman" panose="02020603050405020304" pitchFamily="18" charset="0"/>
+                <a:cs typeface="Times New Roman" panose="02020603050405020304" pitchFamily="18" charset="0"/>
+              </a:rPr>
+              <a:t> The armature coil consists the commutators and brushes</a:t>
+            </a:r>
+          </a:p>
+          <a:p>
+            <a:r>
+              <a:rPr lang="en-US" sz="1800" dirty="0">
+                <a:latin typeface="Times New Roman" panose="02020603050405020304" pitchFamily="18" charset="0"/>
+                <a:cs typeface="Times New Roman" panose="02020603050405020304" pitchFamily="18" charset="0"/>
+              </a:rPr>
+              <a:t> The commutator converts the AC induces in the armature into DC and brushes transfer the current from rotating part of the motor to the stationary external load</a:t>
+            </a:r>
+          </a:p>
+        </p:txBody>
+      </p:sp>
+      <p:pic>
+        <p:nvPicPr>
+          <p:cNvPr id="5" name="Picture 4">
+            <a:extLst>
+              <a:ext uri="{FF2B5EF4-FFF2-40B4-BE49-F238E27FC236}">
+                <a16:creationId xmlns:a16="http://schemas.microsoft.com/office/drawing/2014/main" id="{0783D8FE-3899-4ADA-B270-C4674B1DB91F}"/>
+              </a:ext>
+            </a:extLst>
+          </p:cNvPr>
+          <p:cNvPicPr>
+            <a:picLocks noChangeAspect="1"/>
+          </p:cNvPicPr>
+          <p:nvPr/>
+        </p:nvPicPr>
+        <p:blipFill>
+          <a:blip r:embed="rId3"/>
+          <a:stretch>
+            <a:fillRect/>
+          </a:stretch>
+        </p:blipFill>
+        <p:spPr>
+          <a:xfrm>
+            <a:off x="7934325" y="2165957"/>
+            <a:ext cx="3286125" cy="3286125"/>
+          </a:xfrm>
+          <a:prstGeom prst="rect">
+            <a:avLst/>
+          </a:prstGeom>
+        </p:spPr>
+      </p:pic>
+    </p:spTree>
+    <p:custDataLst>
+      <p:tags r:id="rId1"/>
+    </p:custDataLst>
+    <p:extLst>
+      <p:ext uri="{BB962C8B-B14F-4D97-AF65-F5344CB8AC3E}">
+        <p14:creationId xmlns:p14="http://schemas.microsoft.com/office/powerpoint/2010/main" val="1024972053"/>
+      </p:ext>
+    </p:extLst>
+  </p:cSld>
+  <p:clrMapOvr>
+    <a:masterClrMapping/>
+  </p:clrMapOvr>
+  <p:timing>
+    <p:tnLst>
+      <p:par>
+        <p:cTn id="1" dur="indefinite" restart="never" nodeType="tmRoot">
+          <p:childTnLst>
+            <p:seq concurrent="1" nextAc="seek">
+              <p:cTn id="2" dur="indefinite" nodeType="mainSeq">
+                <p:childTnLst>
+                  <p:par>
+                    <p:cTn id="3" fill="hold">
+                      <p:stCondLst>
+                        <p:cond delay="indefinite"/>
+                      </p:stCondLst>
+                      <p:childTnLst>
+                        <p:par>
+                          <p:cTn id="4" fill="hold">
+                            <p:stCondLst>
+                              <p:cond delay="0"/>
+                            </p:stCondLst>
+                            <p:childTnLst>
+                              <p:par>
+                                <p:cTn id="5" presetID="42" presetClass="entr" presetSubtype="0" fill="hold" nodeType="clickEffect">
+                                  <p:stCondLst>
+                                    <p:cond delay="0"/>
+                                  </p:stCondLst>
+                                  <p:childTnLst>
+                                    <p:set>
+                                      <p:cBhvr>
+                                        <p:cTn id="6" dur="1" fill="hold">
+                                          <p:stCondLst>
+                                            <p:cond delay="0"/>
+                                          </p:stCondLst>
+                                        </p:cTn>
+                                        <p:tgtEl>
+                                          <p:spTgt spid="5"/>
+                                        </p:tgtEl>
+                                        <p:attrNameLst>
+                                          <p:attrName>style.visibility</p:attrName>
+                                        </p:attrNameLst>
+                                      </p:cBhvr>
+                                      <p:to>
+                                        <p:strVal val="visible"/>
+                                      </p:to>
+                                    </p:set>
+                                    <p:animEffect transition="in" filter="fade">
+                                      <p:cBhvr>
+                                        <p:cTn id="7" dur="1000"/>
+                                        <p:tgtEl>
+                                          <p:spTgt spid="5"/>
+                                        </p:tgtEl>
+                                      </p:cBhvr>
+                                    </p:animEffect>
+                                    <p:anim calcmode="lin" valueType="num">
+                                      <p:cBhvr>
+                                        <p:cTn id="8" dur="1000" fill="hold"/>
+                                        <p:tgtEl>
+                                          <p:spTgt spid="5"/>
+                                        </p:tgtEl>
+                                        <p:attrNameLst>
+                                          <p:attrName>ppt_x</p:attrName>
+                                        </p:attrNameLst>
+                                      </p:cBhvr>
+                                      <p:tavLst>
+                                        <p:tav tm="0">
+                                          <p:val>
+                                            <p:strVal val="#ppt_x"/>
+                                          </p:val>
+                                        </p:tav>
+                                        <p:tav tm="100000">
+                                          <p:val>
+                                            <p:strVal val="#ppt_x"/>
+                                          </p:val>
+                                        </p:tav>
+                                      </p:tavLst>
+                                    </p:anim>
+                                    <p:anim calcmode="lin" valueType="num">
+                                      <p:cBhvr>
+                                        <p:cTn id="9" dur="1000" fill="hold"/>
+                                        <p:tgtEl>
+                                          <p:spTgt spid="5"/>
+                                        </p:tgtEl>
+                                        <p:attrNameLst>
+                                          <p:attrName>ppt_y</p:attrName>
+                                        </p:attrNameLst>
+                                      </p:cBhvr>
+                                      <p:tavLst>
+                                        <p:tav tm="0">
+                                          <p:val>
+                                            <p:strVal val="#ppt_y+.1"/>
+                                          </p:val>
+                                        </p:tav>
+                                        <p:tav tm="100000">
+                                          <p:val>
+                                            <p:strVal val="#ppt_y"/>
+                                          </p:val>
+                                        </p:tav>
+                                      </p:tavLst>
+                                    </p:anim>
+                                  </p:childTnLst>
+                                </p:cTn>
+                              </p:par>
+                            </p:childTnLst>
+                          </p:cTn>
+                        </p:par>
+                      </p:childTnLst>
+                    </p:cTn>
+                  </p:par>
+                  <p:par>
+                    <p:cTn id="10" fill="hold">
+                      <p:stCondLst>
+                        <p:cond delay="indefinite"/>
+                      </p:stCondLst>
+                      <p:childTnLst>
+                        <p:par>
+                          <p:cTn id="11" fill="hold">
+                            <p:stCondLst>
+                              <p:cond delay="0"/>
+                            </p:stCondLst>
+                            <p:childTnLst>
+                              <p:par>
+                                <p:cTn id="12" presetID="10" presetClass="entr" presetSubtype="0" fill="hold" grpId="0" nodeType="clickEffect">
+                                  <p:stCondLst>
+                                    <p:cond delay="0"/>
+                                  </p:stCondLst>
+                                  <p:childTnLst>
+                                    <p:set>
+                                      <p:cBhvr>
+                                        <p:cTn id="13" dur="1" fill="hold">
+                                          <p:stCondLst>
+                                            <p:cond delay="0"/>
+                                          </p:stCondLst>
+                                        </p:cTn>
+                                        <p:tgtEl>
+                                          <p:spTgt spid="3">
+                                            <p:txEl>
+                                              <p:pRg st="0" end="0"/>
+                                            </p:txEl>
+                                          </p:spTgt>
+                                        </p:tgtEl>
+                                        <p:attrNameLst>
+                                          <p:attrName>style.visibility</p:attrName>
+                                        </p:attrNameLst>
+                                      </p:cBhvr>
+                                      <p:to>
+                                        <p:strVal val="visible"/>
+                                      </p:to>
+                                    </p:set>
+                                    <p:animEffect transition="in" filter="fade">
+                                      <p:cBhvr>
+                                        <p:cTn id="14" dur="500"/>
+                                        <p:tgtEl>
+                                          <p:spTgt spid="3">
+                                            <p:txEl>
+                                              <p:pRg st="0" end="0"/>
+                                            </p:txEl>
+                                          </p:spTgt>
+                                        </p:tgtEl>
+                                      </p:cBhvr>
+                                    </p:animEffect>
+                                  </p:childTnLst>
+                                </p:cTn>
+                              </p:par>
+                            </p:childTnLst>
+                          </p:cTn>
+                        </p:par>
+                      </p:childTnLst>
+                    </p:cTn>
+                  </p:par>
+                  <p:par>
+                    <p:cTn id="15" fill="hold">
+                      <p:stCondLst>
+                        <p:cond delay="indefinite"/>
+                      </p:stCondLst>
+                      <p:childTnLst>
+                        <p:par>
+                          <p:cTn id="16" fill="hold">
+                            <p:stCondLst>
+                              <p:cond delay="0"/>
+                            </p:stCondLst>
+                            <p:childTnLst>
+                              <p:par>
+                                <p:cTn id="17" presetID="10" presetClass="entr" presetSubtype="0" fill="hold" grpId="0" nodeType="clickEffect">
+                                  <p:stCondLst>
+                                    <p:cond delay="0"/>
+                                  </p:stCondLst>
+                                  <p:childTnLst>
+                                    <p:set>
+                                      <p:cBhvr>
+                                        <p:cTn id="18" dur="1" fill="hold">
+                                          <p:stCondLst>
+                                            <p:cond delay="0"/>
+                                          </p:stCondLst>
+                                        </p:cTn>
+                                        <p:tgtEl>
+                                          <p:spTgt spid="3">
+                                            <p:txEl>
+                                              <p:pRg st="1" end="1"/>
+                                            </p:txEl>
+                                          </p:spTgt>
+                                        </p:tgtEl>
+                                        <p:attrNameLst>
+                                          <p:attrName>style.visibility</p:attrName>
+                                        </p:attrNameLst>
+                                      </p:cBhvr>
+                                      <p:to>
+                                        <p:strVal val="visible"/>
+                                      </p:to>
+                                    </p:set>
+                                    <p:animEffect transition="in" filter="fade">
+                                      <p:cBhvr>
+                                        <p:cTn id="19" dur="500"/>
+                                        <p:tgtEl>
+                                          <p:spTgt spid="3">
+                                            <p:txEl>
+                                              <p:pRg st="1" end="1"/>
+                                            </p:txEl>
+                                          </p:spTgt>
+                                        </p:tgtEl>
+                                      </p:cBhvr>
+                                    </p:animEffect>
+                                  </p:childTnLst>
+                                </p:cTn>
+                              </p:par>
+                            </p:childTnLst>
+                          </p:cTn>
+                        </p:par>
+                      </p:childTnLst>
+                    </p:cTn>
+                  </p:par>
+                  <p:par>
+                    <p:cTn id="20" fill="hold">
+                      <p:stCondLst>
+                        <p:cond delay="indefinite"/>
+                      </p:stCondLst>
+                      <p:childTnLst>
+                        <p:par>
+                          <p:cTn id="21" fill="hold">
+                            <p:stCondLst>
+                              <p:cond delay="0"/>
+                            </p:stCondLst>
+                            <p:childTnLst>
+                              <p:par>
+                                <p:cTn id="22" presetID="10" presetClass="entr" presetSubtype="0" fill="hold" grpId="0" nodeType="clickEffect">
+                                  <p:stCondLst>
+                                    <p:cond delay="0"/>
+                                  </p:stCondLst>
+                                  <p:childTnLst>
+                                    <p:set>
+                                      <p:cBhvr>
+                                        <p:cTn id="23" dur="1" fill="hold">
+                                          <p:stCondLst>
+                                            <p:cond delay="0"/>
+                                          </p:stCondLst>
+                                        </p:cTn>
+                                        <p:tgtEl>
+                                          <p:spTgt spid="3">
+                                            <p:txEl>
+                                              <p:pRg st="2" end="2"/>
+                                            </p:txEl>
+                                          </p:spTgt>
+                                        </p:tgtEl>
+                                        <p:attrNameLst>
+                                          <p:attrName>style.visibility</p:attrName>
+                                        </p:attrNameLst>
+                                      </p:cBhvr>
+                                      <p:to>
+                                        <p:strVal val="visible"/>
+                                      </p:to>
+                                    </p:set>
+                                    <p:animEffect transition="in" filter="fade">
+                                      <p:cBhvr>
+                                        <p:cTn id="24" dur="500"/>
+                                        <p:tgtEl>
+                                          <p:spTgt spid="3">
+                                            <p:txEl>
+                                              <p:pRg st="2" end="2"/>
+                                            </p:txEl>
+                                          </p:spTgt>
+                                        </p:tgtEl>
+                                      </p:cBhvr>
+                                    </p:animEffect>
+                                  </p:childTnLst>
+                                </p:cTn>
+                              </p:par>
+                            </p:childTnLst>
+                          </p:cTn>
+                        </p:par>
+                      </p:childTnLst>
+                    </p:cTn>
+                  </p:par>
+                  <p:par>
+                    <p:cTn id="25" fill="hold">
+                      <p:stCondLst>
+                        <p:cond delay="indefinite"/>
+                      </p:stCondLst>
+                      <p:childTnLst>
+                        <p:par>
+                          <p:cTn id="26" fill="hold">
+                            <p:stCondLst>
+                              <p:cond delay="0"/>
+                            </p:stCondLst>
+                            <p:childTnLst>
+                              <p:par>
+                                <p:cTn id="27" presetID="10" presetClass="entr" presetSubtype="0" fill="hold" grpId="0" nodeType="clickEffect">
+                                  <p:stCondLst>
+                                    <p:cond delay="0"/>
+                                  </p:stCondLst>
+                                  <p:childTnLst>
+                                    <p:set>
+                                      <p:cBhvr>
+                                        <p:cTn id="28" dur="1" fill="hold">
+                                          <p:stCondLst>
+                                            <p:cond delay="0"/>
+                                          </p:stCondLst>
+                                        </p:cTn>
+                                        <p:tgtEl>
+                                          <p:spTgt spid="3">
+                                            <p:txEl>
+                                              <p:pRg st="3" end="3"/>
+                                            </p:txEl>
+                                          </p:spTgt>
+                                        </p:tgtEl>
+                                        <p:attrNameLst>
+                                          <p:attrName>style.visibility</p:attrName>
+                                        </p:attrNameLst>
+                                      </p:cBhvr>
+                                      <p:to>
+                                        <p:strVal val="visible"/>
+                                      </p:to>
+                                    </p:set>
+                                    <p:animEffect transition="in" filter="fade">
+                                      <p:cBhvr>
+                                        <p:cTn id="29" dur="500"/>
+                                        <p:tgtEl>
+                                          <p:spTgt spid="3">
+                                            <p:txEl>
+                                              <p:pRg st="3" end="3"/>
+                                            </p:txEl>
+                                          </p:spTgt>
+                                        </p:tgtEl>
+                                      </p:cBhvr>
+                                    </p:animEffect>
+                                  </p:childTnLst>
+                                </p:cTn>
+                              </p:par>
+                            </p:childTnLst>
+                          </p:cTn>
+                        </p:par>
+                      </p:childTnLst>
+                    </p:cTn>
+                  </p:par>
+                  <p:par>
+                    <p:cTn id="30" fill="hold">
+                      <p:stCondLst>
+                        <p:cond delay="indefinite"/>
+                      </p:stCondLst>
+                      <p:childTnLst>
+                        <p:par>
+                          <p:cTn id="31" fill="hold">
+                            <p:stCondLst>
+                              <p:cond delay="0"/>
+                            </p:stCondLst>
+                            <p:childTnLst>
+                              <p:par>
+                                <p:cTn id="32" presetID="10" presetClass="entr" presetSubtype="0" fill="hold" grpId="0" nodeType="clickEffect">
+                                  <p:stCondLst>
+                                    <p:cond delay="0"/>
+                                  </p:stCondLst>
+                                  <p:childTnLst>
+                                    <p:set>
+                                      <p:cBhvr>
+                                        <p:cTn id="33" dur="1" fill="hold">
+                                          <p:stCondLst>
+                                            <p:cond delay="0"/>
+                                          </p:stCondLst>
+                                        </p:cTn>
+                                        <p:tgtEl>
+                                          <p:spTgt spid="3">
+                                            <p:txEl>
+                                              <p:pRg st="4" end="4"/>
+                                            </p:txEl>
+                                          </p:spTgt>
+                                        </p:tgtEl>
+                                        <p:attrNameLst>
+                                          <p:attrName>style.visibility</p:attrName>
+                                        </p:attrNameLst>
+                                      </p:cBhvr>
+                                      <p:to>
+                                        <p:strVal val="visible"/>
+                                      </p:to>
+                                    </p:set>
+                                    <p:animEffect transition="in" filter="fade">
+                                      <p:cBhvr>
+                                        <p:cTn id="34" dur="500"/>
+                                        <p:tgtEl>
+                                          <p:spTgt spid="3">
+                                            <p:txEl>
+                                              <p:pRg st="4" end="4"/>
+                                            </p:txEl>
+                                          </p:spTgt>
+                                        </p:tgtEl>
+                                      </p:cBhvr>
+                                    </p:animEffect>
+                                  </p:childTnLst>
+                                </p:cTn>
+                              </p:par>
+                            </p:childTnLst>
+                          </p:cTn>
+                        </p:par>
+                      </p:childTnLst>
+                    </p:cTn>
+                  </p:par>
+                </p:childTnLst>
+              </p:cTn>
+              <p:prevCondLst>
+                <p:cond evt="onPrev" delay="0">
+                  <p:tgtEl>
+                    <p:sldTgt/>
+                  </p:tgtEl>
+                </p:cond>
+              </p:prevCondLst>
+              <p:nextCondLst>
+                <p:cond evt="onNext" delay="0">
+                  <p:tgtEl>
+                    <p:sldTgt/>
+                  </p:tgtEl>
+                </p:cond>
+              </p:nextCondLst>
+            </p:seq>
+          </p:childTnLst>
+        </p:cTn>
+      </p:par>
+    </p:tnLst>
+    <p:bldLst>
+      <p:bldP spid="3" grpId="0" build="p"/>
+    </p:bldLst>
+  </p:timing>
+</p:sld>
+</file>
+
+<file path=ppt/slides/slide7.xml><?xml version="1.0" encoding="utf-8"?>
+<p:sld xmlns:a="http://schemas.openxmlformats.org/drawingml/2006/main" xmlns:r="http://schemas.openxmlformats.org/officeDocument/2006/relationships" xmlns:p="http://schemas.openxmlformats.org/presentationml/2006/main">
+  <p:cSld>
+    <p:spTree>
+      <p:nvGrpSpPr>
+        <p:cNvPr id="1" name=""/>
+        <p:cNvGrpSpPr/>
+        <p:nvPr/>
+      </p:nvGrpSpPr>
+      <p:grpSpPr>
+        <a:xfrm>
+          <a:off x="0" y="0"/>
+          <a:ext cx="0" cy="0"/>
+          <a:chOff x="0" y="0"/>
+          <a:chExt cx="0" cy="0"/>
+        </a:xfrm>
+      </p:grpSpPr>
+      <p:sp>
+        <p:nvSpPr>
+          <p:cNvPr id="2" name="Title 1">
+            <a:extLst>
+              <a:ext uri="{FF2B5EF4-FFF2-40B4-BE49-F238E27FC236}">
+                <a16:creationId xmlns:a16="http://schemas.microsoft.com/office/drawing/2014/main" id="{D3119577-4EB2-475F-B52A-B609C567AD88}"/>
+              </a:ext>
+            </a:extLst>
+          </p:cNvPr>
+          <p:cNvSpPr>
+            <a:spLocks noGrp="1"/>
+          </p:cNvSpPr>
+          <p:nvPr>
+            <p:ph type="title"/>
+          </p:nvPr>
+        </p:nvSpPr>
+        <p:spPr/>
+        <p:txBody>
+          <a:bodyPr>
+            <a:noAutofit/>
+          </a:bodyPr>
+          <a:lstStyle/>
+          <a:p>
+            <a:r>
+              <a:rPr lang="en-US" sz="4000" cap="none" dirty="0"/>
+              <a:t>MOTOR DRIVER(L293D)</a:t>
+            </a:r>
+            <a:endParaRPr lang="en-IN" sz="4000" cap="none" dirty="0"/>
+          </a:p>
+        </p:txBody>
+      </p:sp>
+      <p:sp>
+        <p:nvSpPr>
+          <p:cNvPr id="3" name="Content Placeholder 2">
+            <a:extLst>
+              <a:ext uri="{FF2B5EF4-FFF2-40B4-BE49-F238E27FC236}">
+                <a16:creationId xmlns:a16="http://schemas.microsoft.com/office/drawing/2014/main" id="{FA2CC252-F25C-4B97-B7D9-51BB6C2D1B71}"/>
+              </a:ext>
+            </a:extLst>
+          </p:cNvPr>
+          <p:cNvSpPr>
+            <a:spLocks noGrp="1"/>
+          </p:cNvSpPr>
+          <p:nvPr>
+            <p:ph idx="1"/>
+          </p:nvPr>
+        </p:nvSpPr>
+        <p:spPr>
+          <a:xfrm>
+            <a:off x="979487" y="1849436"/>
+            <a:ext cx="7126287" cy="4579939"/>
+          </a:xfrm>
+        </p:spPr>
+        <p:txBody>
+          <a:bodyPr>
+            <a:noAutofit/>
+          </a:bodyPr>
+          <a:lstStyle/>
+          <a:p>
+            <a:pPr>
+              <a:lnSpc>
+                <a:spcPct val="100000"/>
+              </a:lnSpc>
+            </a:pPr>
+            <a:r>
+              <a:rPr lang="en-US" sz="1800" dirty="0">
+                <a:latin typeface="Times New Roman" panose="02020603050405020304" pitchFamily="18" charset="0"/>
+                <a:cs typeface="Times New Roman" panose="02020603050405020304" pitchFamily="18" charset="0"/>
+              </a:rPr>
+              <a:t>A motor driver is an integrated circuit chip which is usually used to control motors</a:t>
+            </a:r>
+          </a:p>
+          <a:p>
+            <a:pPr>
+              <a:lnSpc>
+                <a:spcPct val="100000"/>
+              </a:lnSpc>
+            </a:pPr>
+            <a:r>
+              <a:rPr lang="en-US" sz="1800" dirty="0">
+                <a:latin typeface="Times New Roman" panose="02020603050405020304" pitchFamily="18" charset="0"/>
+                <a:cs typeface="Times New Roman" panose="02020603050405020304" pitchFamily="18" charset="0"/>
+              </a:rPr>
+              <a:t>Motor driver act as an interface between Arduino and the motors</a:t>
+            </a:r>
+          </a:p>
+          <a:p>
+            <a:pPr>
+              <a:lnSpc>
+                <a:spcPct val="100000"/>
+              </a:lnSpc>
+            </a:pPr>
+            <a:r>
+              <a:rPr lang="en-US" sz="1800" dirty="0">
+                <a:latin typeface="Times New Roman" panose="02020603050405020304" pitchFamily="18" charset="0"/>
+                <a:cs typeface="Times New Roman" panose="02020603050405020304" pitchFamily="18" charset="0"/>
+              </a:rPr>
+              <a:t>The most commonly used motor driver </a:t>
+            </a:r>
+            <a:r>
+              <a:rPr lang="en-US" sz="1800" dirty="0" err="1">
+                <a:latin typeface="Times New Roman" panose="02020603050405020304" pitchFamily="18" charset="0"/>
+                <a:cs typeface="Times New Roman" panose="02020603050405020304" pitchFamily="18" charset="0"/>
+              </a:rPr>
+              <a:t>ic’s</a:t>
+            </a:r>
+            <a:r>
+              <a:rPr lang="en-US" sz="1800" dirty="0">
+                <a:latin typeface="Times New Roman" panose="02020603050405020304" pitchFamily="18" charset="0"/>
+                <a:cs typeface="Times New Roman" panose="02020603050405020304" pitchFamily="18" charset="0"/>
+              </a:rPr>
+              <a:t> are from the L293 series such as L293D, L293NE, etc.</a:t>
+            </a:r>
+          </a:p>
+          <a:p>
+            <a:pPr>
+              <a:lnSpc>
+                <a:spcPct val="100000"/>
+              </a:lnSpc>
+            </a:pPr>
+            <a:r>
+              <a:rPr lang="en-US" sz="1800" dirty="0">
+                <a:latin typeface="Times New Roman" panose="02020603050405020304" pitchFamily="18" charset="0"/>
+                <a:cs typeface="Times New Roman" panose="02020603050405020304" pitchFamily="18" charset="0"/>
+              </a:rPr>
+              <a:t>These ICs are designed to control 2 DC motors simultaneously.</a:t>
+            </a:r>
+          </a:p>
+          <a:p>
+            <a:pPr>
+              <a:lnSpc>
+                <a:spcPct val="100000"/>
+              </a:lnSpc>
+            </a:pPr>
+            <a:r>
+              <a:rPr lang="en-US" sz="1800" dirty="0">
+                <a:latin typeface="Times New Roman" panose="02020603050405020304" pitchFamily="18" charset="0"/>
+                <a:cs typeface="Times New Roman" panose="02020603050405020304" pitchFamily="18" charset="0"/>
+              </a:rPr>
+              <a:t>L293D consist of two H-bridge, circuit for controlling a low current rated motor</a:t>
+            </a:r>
+            <a:endParaRPr lang="en-IN" sz="1800" dirty="0">
+              <a:latin typeface="Times New Roman" panose="02020603050405020304" pitchFamily="18" charset="0"/>
+              <a:cs typeface="Times New Roman" panose="02020603050405020304" pitchFamily="18" charset="0"/>
+            </a:endParaRPr>
+          </a:p>
+          <a:p>
+            <a:pPr>
+              <a:lnSpc>
+                <a:spcPct val="100000"/>
+              </a:lnSpc>
+            </a:pPr>
+            <a:r>
+              <a:rPr lang="en-IN" sz="1800" dirty="0">
+                <a:latin typeface="Times New Roman" panose="02020603050405020304" pitchFamily="18" charset="0"/>
+                <a:cs typeface="Times New Roman" panose="02020603050405020304" pitchFamily="18" charset="0"/>
+              </a:rPr>
+              <a:t>It is designed to provide bidirectional drive currents of up to 600-mA at voltages from 4.5 V to 36 V</a:t>
+            </a:r>
+            <a:endParaRPr lang="en-US" sz="1800" dirty="0">
+              <a:latin typeface="Times New Roman" panose="02020603050405020304" pitchFamily="18" charset="0"/>
+              <a:cs typeface="Times New Roman" panose="02020603050405020304" pitchFamily="18" charset="0"/>
+            </a:endParaRPr>
+          </a:p>
+        </p:txBody>
+      </p:sp>
+      <p:pic>
+        <p:nvPicPr>
+          <p:cNvPr id="5" name="Picture 4">
+            <a:extLst>
+              <a:ext uri="{FF2B5EF4-FFF2-40B4-BE49-F238E27FC236}">
+                <a16:creationId xmlns:a16="http://schemas.microsoft.com/office/drawing/2014/main" id="{8D68628B-AA64-403C-8519-7831EA0B3D55}"/>
+              </a:ext>
+            </a:extLst>
+          </p:cNvPr>
+          <p:cNvPicPr>
+            <a:picLocks noChangeAspect="1"/>
+          </p:cNvPicPr>
+          <p:nvPr/>
+        </p:nvPicPr>
+        <p:blipFill>
+          <a:blip r:embed="rId3"/>
+          <a:stretch>
+            <a:fillRect/>
+          </a:stretch>
+        </p:blipFill>
+        <p:spPr>
+          <a:xfrm>
+            <a:off x="8105775" y="2097088"/>
+            <a:ext cx="3386138" cy="3386138"/>
+          </a:xfrm>
+          <a:prstGeom prst="rect">
+            <a:avLst/>
+          </a:prstGeom>
+        </p:spPr>
+      </p:pic>
+    </p:spTree>
+    <p:custDataLst>
+      <p:tags r:id="rId1"/>
+    </p:custDataLst>
+    <p:extLst>
+      <p:ext uri="{BB962C8B-B14F-4D97-AF65-F5344CB8AC3E}">
+        <p14:creationId xmlns:p14="http://schemas.microsoft.com/office/powerpoint/2010/main" val="744237103"/>
+      </p:ext>
+    </p:extLst>
+  </p:cSld>
+  <p:clrMapOvr>
+    <a:masterClrMapping/>
+  </p:clrMapOvr>
+  <p:timing>
+    <p:tnLst>
+      <p:par>
+        <p:cTn id="1" dur="indefinite" restart="never" nodeType="tmRoot">
+          <p:childTnLst>
+            <p:seq concurrent="1" nextAc="seek">
+              <p:cTn id="2" dur="indefinite" nodeType="mainSeq">
+                <p:childTnLst>
+                  <p:par>
+                    <p:cTn id="3" fill="hold">
+                      <p:stCondLst>
+                        <p:cond delay="indefinite"/>
+                      </p:stCondLst>
+                      <p:childTnLst>
+                        <p:par>
+                          <p:cTn id="4" fill="hold">
+                            <p:stCondLst>
+                              <p:cond delay="0"/>
+                            </p:stCondLst>
+                            <p:childTnLst>
+                              <p:par>
+                                <p:cTn id="5" presetID="10" presetClass="entr" presetSubtype="0" fill="hold" nodeType="clickEffect">
+                                  <p:stCondLst>
+                                    <p:cond delay="0"/>
+                                  </p:stCondLst>
+                                  <p:childTnLst>
+                                    <p:set>
+                                      <p:cBhvr>
+                                        <p:cTn id="6" dur="1" fill="hold">
+                                          <p:stCondLst>
+                                            <p:cond delay="0"/>
+                                          </p:stCondLst>
+                                        </p:cTn>
+                                        <p:tgtEl>
+                                          <p:spTgt spid="5"/>
+                                        </p:tgtEl>
+                                        <p:attrNameLst>
+                                          <p:attrName>style.visibility</p:attrName>
+                                        </p:attrNameLst>
+                                      </p:cBhvr>
+                                      <p:to>
+                                        <p:strVal val="visible"/>
+                                      </p:to>
+                                    </p:set>
+                                    <p:animEffect transition="in" filter="fade">
+                                      <p:cBhvr>
+                                        <p:cTn id="7" dur="500"/>
+                                        <p:tgtEl>
+                                          <p:spTgt spid="5"/>
+                                        </p:tgtEl>
+                                      </p:cBhvr>
+                                    </p:animEffect>
+                                  </p:childTnLst>
+                                </p:cTn>
+                              </p:par>
+                            </p:childTnLst>
+                          </p:cTn>
+                        </p:par>
+                      </p:childTnLst>
+                    </p:cTn>
+                  </p:par>
+                  <p:par>
+                    <p:cTn id="8" fill="hold">
+                      <p:stCondLst>
+                        <p:cond delay="indefinite"/>
+                      </p:stCondLst>
+                      <p:childTnLst>
+                        <p:par>
+                          <p:cTn id="9" fill="hold">
+                            <p:stCondLst>
+                              <p:cond delay="0"/>
+                            </p:stCondLst>
+                            <p:childTnLst>
+                              <p:par>
+                                <p:cTn id="10" presetID="10" presetClass="entr" presetSubtype="0" fill="hold" grpId="0" nodeType="clickEffect">
+                                  <p:stCondLst>
+                                    <p:cond delay="0"/>
+                                  </p:stCondLst>
+                                  <p:childTnLst>
+                                    <p:set>
+                                      <p:cBhvr>
+                                        <p:cTn id="11" dur="1" fill="hold">
+                                          <p:stCondLst>
+                                            <p:cond delay="0"/>
+                                          </p:stCondLst>
+                                        </p:cTn>
+                                        <p:tgtEl>
+                                          <p:spTgt spid="3">
+                                            <p:txEl>
+                                              <p:pRg st="0" end="0"/>
+                                            </p:txEl>
+                                          </p:spTgt>
+                                        </p:tgtEl>
+                                        <p:attrNameLst>
+                                          <p:attrName>style.visibility</p:attrName>
+                                        </p:attrNameLst>
+                                      </p:cBhvr>
+                                      <p:to>
+                                        <p:strVal val="visible"/>
+                                      </p:to>
+                                    </p:set>
+                                    <p:animEffect transition="in" filter="fade">
+                                      <p:cBhvr>
+                                        <p:cTn id="12" dur="500"/>
+                                        <p:tgtEl>
+                                          <p:spTgt spid="3">
+                                            <p:txEl>
+                                              <p:pRg st="0" end="0"/>
+                                            </p:txEl>
+                                          </p:spTgt>
+                                        </p:tgtEl>
+                                      </p:cBhvr>
+                                    </p:animEffect>
+                                  </p:childTnLst>
+                                </p:cTn>
+                              </p:par>
+                            </p:childTnLst>
+                          </p:cTn>
+                        </p:par>
+                      </p:childTnLst>
+                    </p:cTn>
+                  </p:par>
+                  <p:par>
+                    <p:cTn id="13" fill="hold">
+                      <p:stCondLst>
+                        <p:cond delay="indefinite"/>
+                      </p:stCondLst>
+                      <p:childTnLst>
+                        <p:par>
+                          <p:cTn id="14" fill="hold">
+                            <p:stCondLst>
+                              <p:cond delay="0"/>
+                            </p:stCondLst>
+                            <p:childTnLst>
+                              <p:par>
+                                <p:cTn id="15" presetID="10" presetClass="entr" presetSubtype="0" fill="hold" grpId="0" nodeType="clickEffect">
+                                  <p:stCondLst>
+                                    <p:cond delay="0"/>
+                                  </p:stCondLst>
+                                  <p:childTnLst>
+                                    <p:set>
+                                      <p:cBhvr>
+                                        <p:cTn id="16" dur="1" fill="hold">
+                                          <p:stCondLst>
+                                            <p:cond delay="0"/>
+                                          </p:stCondLst>
+                                        </p:cTn>
+                                        <p:tgtEl>
+                                          <p:spTgt spid="3">
+                                            <p:txEl>
+                                              <p:pRg st="1" end="1"/>
+                                            </p:txEl>
+                                          </p:spTgt>
+                                        </p:tgtEl>
+                                        <p:attrNameLst>
+                                          <p:attrName>style.visibility</p:attrName>
+                                        </p:attrNameLst>
+                                      </p:cBhvr>
+                                      <p:to>
+                                        <p:strVal val="visible"/>
+                                      </p:to>
+                                    </p:set>
+                                    <p:animEffect transition="in" filter="fade">
+                                      <p:cBhvr>
+                                        <p:cTn id="17" dur="500"/>
+                                        <p:tgtEl>
+                                          <p:spTgt spid="3">
+                                            <p:txEl>
+                                              <p:pRg st="1" end="1"/>
+                                            </p:txEl>
+                                          </p:spTgt>
+                                        </p:tgtEl>
+                                      </p:cBhvr>
+                                    </p:animEffect>
+                                  </p:childTnLst>
+                                </p:cTn>
+                              </p:par>
+                            </p:childTnLst>
+                          </p:cTn>
+                        </p:par>
+                      </p:childTnLst>
+                    </p:cTn>
+                  </p:par>
+                  <p:par>
+                    <p:cTn id="18" fill="hold">
+                      <p:stCondLst>
+                        <p:cond delay="indefinite"/>
+                      </p:stCondLst>
+                      <p:childTnLst>
+                        <p:par>
+                          <p:cTn id="19" fill="hold">
+                            <p:stCondLst>
+                              <p:cond delay="0"/>
+                            </p:stCondLst>
+                            <p:childTnLst>
+                              <p:par>
+                                <p:cTn id="20" presetID="10" presetClass="entr" presetSubtype="0" fill="hold" grpId="0" nodeType="clickEffect">
+                                  <p:stCondLst>
+                                    <p:cond delay="0"/>
+                                  </p:stCondLst>
+                                  <p:childTnLst>
+                                    <p:set>
+                                      <p:cBhvr>
+                                        <p:cTn id="21" dur="1" fill="hold">
+                                          <p:stCondLst>
+                                            <p:cond delay="0"/>
+                                          </p:stCondLst>
+                                        </p:cTn>
+                                        <p:tgtEl>
+                                          <p:spTgt spid="3">
+                                            <p:txEl>
+                                              <p:pRg st="2" end="2"/>
+                                            </p:txEl>
+                                          </p:spTgt>
+                                        </p:tgtEl>
+                                        <p:attrNameLst>
+                                          <p:attrName>style.visibility</p:attrName>
+                                        </p:attrNameLst>
+                                      </p:cBhvr>
+                                      <p:to>
+                                        <p:strVal val="visible"/>
+                                      </p:to>
+                                    </p:set>
+                                    <p:animEffect transition="in" filter="fade">
+                                      <p:cBhvr>
+                                        <p:cTn id="22" dur="500"/>
+                                        <p:tgtEl>
+                                          <p:spTgt spid="3">
+                                            <p:txEl>
+                                              <p:pRg st="2" end="2"/>
+                                            </p:txEl>
+                                          </p:spTgt>
+                                        </p:tgtEl>
+                                      </p:cBhvr>
+                                    </p:animEffect>
+                                  </p:childTnLst>
+                                </p:cTn>
+                              </p:par>
+                            </p:childTnLst>
+                          </p:cTn>
+                        </p:par>
+                      </p:childTnLst>
+                    </p:cTn>
+                  </p:par>
+                  <p:par>
+                    <p:cTn id="23" fill="hold">
+                      <p:stCondLst>
+                        <p:cond delay="indefinite"/>
+                      </p:stCondLst>
+                      <p:childTnLst>
+                        <p:par>
+                          <p:cTn id="24" fill="hold">
+                            <p:stCondLst>
+                              <p:cond delay="0"/>
+                            </p:stCondLst>
+                            <p:childTnLst>
+                              <p:par>
+                                <p:cTn id="25" presetID="10" presetClass="entr" presetSubtype="0" fill="hold" grpId="0" nodeType="clickEffect">
+                                  <p:stCondLst>
+                                    <p:cond delay="0"/>
+                                  </p:stCondLst>
+                                  <p:childTnLst>
+                                    <p:set>
+                                      <p:cBhvr>
+                                        <p:cTn id="26" dur="1" fill="hold">
+                                          <p:stCondLst>
+                                            <p:cond delay="0"/>
+                                          </p:stCondLst>
+                                        </p:cTn>
+                                        <p:tgtEl>
+                                          <p:spTgt spid="3">
+                                            <p:txEl>
+                                              <p:pRg st="3" end="3"/>
+                                            </p:txEl>
+                                          </p:spTgt>
+                                        </p:tgtEl>
+                                        <p:attrNameLst>
+                                          <p:attrName>style.visibility</p:attrName>
+                                        </p:attrNameLst>
+                                      </p:cBhvr>
+                                      <p:to>
+                                        <p:strVal val="visible"/>
+                                      </p:to>
+                                    </p:set>
+                                    <p:animEffect transition="in" filter="fade">
+                                      <p:cBhvr>
+                                        <p:cTn id="27" dur="500"/>
+                                        <p:tgtEl>
+                                          <p:spTgt spid="3">
+                                            <p:txEl>
+                                              <p:pRg st="3" end="3"/>
+                                            </p:txEl>
+                                          </p:spTgt>
+                                        </p:tgtEl>
+                                      </p:cBhvr>
+                                    </p:animEffect>
+                                  </p:childTnLst>
+                                </p:cTn>
+                              </p:par>
+                            </p:childTnLst>
+                          </p:cTn>
+                        </p:par>
+                      </p:childTnLst>
+                    </p:cTn>
+                  </p:par>
+                  <p:par>
+                    <p:cTn id="28" fill="hold">
+                      <p:stCondLst>
+                        <p:cond delay="indefinite"/>
+                      </p:stCondLst>
+                      <p:childTnLst>
+                        <p:par>
+                          <p:cTn id="29" fill="hold">
+                            <p:stCondLst>
+                              <p:cond delay="0"/>
+                            </p:stCondLst>
+                            <p:childTnLst>
+                              <p:par>
+                                <p:cTn id="30" presetID="10" presetClass="entr" presetSubtype="0" fill="hold" grpId="0" nodeType="clickEffect">
+                                  <p:stCondLst>
+                                    <p:cond delay="0"/>
+                                  </p:stCondLst>
+                                  <p:childTnLst>
+                                    <p:set>
+                                      <p:cBhvr>
+                                        <p:cTn id="31" dur="1" fill="hold">
+                                          <p:stCondLst>
+                                            <p:cond delay="0"/>
+                                          </p:stCondLst>
+                                        </p:cTn>
+                                        <p:tgtEl>
+                                          <p:spTgt spid="3">
+                                            <p:txEl>
+                                              <p:pRg st="4" end="4"/>
+                                            </p:txEl>
+                                          </p:spTgt>
+                                        </p:tgtEl>
+                                        <p:attrNameLst>
+                                          <p:attrName>style.visibility</p:attrName>
+                                        </p:attrNameLst>
+                                      </p:cBhvr>
+                                      <p:to>
+                                        <p:strVal val="visible"/>
+                                      </p:to>
+                                    </p:set>
+                                    <p:animEffect transition="in" filter="fade">
+                                      <p:cBhvr>
+                                        <p:cTn id="32" dur="500"/>
+                                        <p:tgtEl>
+                                          <p:spTgt spid="3">
+                                            <p:txEl>
+                                              <p:pRg st="4" end="4"/>
+                                            </p:txEl>
+                                          </p:spTgt>
+                                        </p:tgtEl>
+                                      </p:cBhvr>
+                                    </p:animEffect>
+                                  </p:childTnLst>
+                                </p:cTn>
+                              </p:par>
+                            </p:childTnLst>
+                          </p:cTn>
+                        </p:par>
+                      </p:childTnLst>
+                    </p:cTn>
+                  </p:par>
+                  <p:par>
+                    <p:cTn id="33" fill="hold">
+                      <p:stCondLst>
+                        <p:cond delay="indefinite"/>
+                      </p:stCondLst>
+                      <p:childTnLst>
+                        <p:par>
+                          <p:cTn id="34" fill="hold">
+                            <p:stCondLst>
+                              <p:cond delay="0"/>
+                            </p:stCondLst>
+                            <p:childTnLst>
+                              <p:par>
+                                <p:cTn id="35" presetID="10" presetClass="entr" presetSubtype="0" fill="hold" grpId="0" nodeType="clickEffect">
+                                  <p:stCondLst>
+                                    <p:cond delay="0"/>
+                                  </p:stCondLst>
+                                  <p:childTnLst>
+                                    <p:set>
+                                      <p:cBhvr>
+                                        <p:cTn id="36" dur="1" fill="hold">
+                                          <p:stCondLst>
+                                            <p:cond delay="0"/>
+                                          </p:stCondLst>
+                                        </p:cTn>
+                                        <p:tgtEl>
+                                          <p:spTgt spid="3">
+                                            <p:txEl>
+                                              <p:pRg st="5" end="5"/>
+                                            </p:txEl>
+                                          </p:spTgt>
+                                        </p:tgtEl>
+                                        <p:attrNameLst>
+                                          <p:attrName>style.visibility</p:attrName>
+                                        </p:attrNameLst>
+                                      </p:cBhvr>
+                                      <p:to>
+                                        <p:strVal val="visible"/>
+                                      </p:to>
+                                    </p:set>
+                                    <p:animEffect transition="in" filter="fade">
+                                      <p:cBhvr>
+                                        <p:cTn id="37" dur="500"/>
+                                        <p:tgtEl>
+                                          <p:spTgt spid="3">
+                                            <p:txEl>
+                                              <p:pRg st="5" end="5"/>
+                                            </p:txEl>
+                                          </p:spTgt>
+                                        </p:tgtEl>
+                                      </p:cBhvr>
+                                    </p:animEffect>
+                                  </p:childTnLst>
+                                </p:cTn>
+                              </p:par>
+                            </p:childTnLst>
+                          </p:cTn>
+                        </p:par>
+                      </p:childTnLst>
+                    </p:cTn>
+                  </p:par>
+                </p:childTnLst>
+              </p:cTn>
+              <p:prevCondLst>
+                <p:cond evt="onPrev" delay="0">
+                  <p:tgtEl>
+                    <p:sldTgt/>
+                  </p:tgtEl>
+                </p:cond>
+              </p:prevCondLst>
+              <p:nextCondLst>
+                <p:cond evt="onNext" delay="0">
+                  <p:tgtEl>
+                    <p:sldTgt/>
+                  </p:tgtEl>
+                </p:cond>
+              </p:nextCondLst>
+            </p:seq>
+          </p:childTnLst>
+        </p:cTn>
+      </p:par>
+    </p:tnLst>
+    <p:bldLst>
+      <p:bldP spid="3" grpId="0" build="p"/>
+    </p:bldLst>
+  </p:timing>
+</p:sld>
+</file>
+
+<file path=ppt/slides/slide8.xml><?xml version="1.0" encoding="utf-8"?>
+<p:sld xmlns:a="http://schemas.openxmlformats.org/drawingml/2006/main" xmlns:r="http://schemas.openxmlformats.org/officeDocument/2006/relationships" xmlns:p="http://schemas.openxmlformats.org/presentationml/2006/main">
+  <p:cSld>
+    <p:spTree>
+      <p:nvGrpSpPr>
+        <p:cNvPr id="1" name=""/>
+        <p:cNvGrpSpPr/>
+        <p:nvPr/>
+      </p:nvGrpSpPr>
+      <p:grpSpPr>
+        <a:xfrm>
+          <a:off x="0" y="0"/>
+          <a:ext cx="0" cy="0"/>
+          <a:chOff x="0" y="0"/>
+          <a:chExt cx="0" cy="0"/>
+        </a:xfrm>
+      </p:grpSpPr>
+      <p:sp>
+        <p:nvSpPr>
+          <p:cNvPr id="2" name="Title 1">
+            <a:extLst>
+              <a:ext uri="{FF2B5EF4-FFF2-40B4-BE49-F238E27FC236}">
+                <a16:creationId xmlns:a16="http://schemas.microsoft.com/office/drawing/2014/main" id="{58494240-8FDB-4761-B8A3-AE58ECCD9A0B}"/>
+              </a:ext>
+            </a:extLst>
+          </p:cNvPr>
+          <p:cNvSpPr>
+            <a:spLocks noGrp="1"/>
+          </p:cNvSpPr>
+          <p:nvPr>
+            <p:ph type="title"/>
+          </p:nvPr>
+        </p:nvSpPr>
+        <p:spPr>
+          <a:xfrm>
+            <a:off x="874713" y="370867"/>
+            <a:ext cx="9905998" cy="1478570"/>
+          </a:xfrm>
+        </p:spPr>
+        <p:txBody>
+          <a:bodyPr/>
+          <a:lstStyle/>
+          <a:p>
+            <a:r>
+              <a:rPr lang="en-IN" dirty="0"/>
+              <a:t>Code and algorithm</a:t>
+            </a:r>
+          </a:p>
+        </p:txBody>
+      </p:sp>
+      <p:pic>
+        <p:nvPicPr>
+          <p:cNvPr id="15" name="Content Placeholder 14">
+            <a:extLst>
+              <a:ext uri="{FF2B5EF4-FFF2-40B4-BE49-F238E27FC236}">
+                <a16:creationId xmlns:a16="http://schemas.microsoft.com/office/drawing/2014/main" id="{A12AAE90-984E-4174-893D-AE5E965D802A}"/>
+              </a:ext>
+            </a:extLst>
+          </p:cNvPr>
+          <p:cNvPicPr>
+            <a:picLocks noGrp="1" noChangeAspect="1"/>
+          </p:cNvPicPr>
+          <p:nvPr>
+            <p:ph idx="1"/>
+          </p:nvPr>
+        </p:nvPicPr>
+        <p:blipFill>
+          <a:blip r:embed="rId3"/>
+          <a:stretch>
+            <a:fillRect/>
+          </a:stretch>
+        </p:blipFill>
+        <p:spPr>
+          <a:xfrm>
+            <a:off x="2967479" y="1483698"/>
+            <a:ext cx="5766946" cy="5003435"/>
+          </a:xfrm>
+        </p:spPr>
+      </p:pic>
+    </p:spTree>
+    <p:custDataLst>
+      <p:tags r:id="rId1"/>
+    </p:custDataLst>
+    <p:extLst>
+      <p:ext uri="{BB962C8B-B14F-4D97-AF65-F5344CB8AC3E}">
+        <p14:creationId xmlns:p14="http://schemas.microsoft.com/office/powerpoint/2010/main" val="156409760"/>
+      </p:ext>
+    </p:extLst>
+  </p:cSld>
+  <p:clrMapOvr>
+    <a:masterClrMapping/>
+  </p:clrMapOvr>
+  <p:timing>
+    <p:tnLst>
+      <p:par>
+        <p:cTn id="1" dur="indefinite" restart="never" nodeType="tmRoot">
+          <p:childTnLst>
+            <p:seq concurrent="1" nextAc="seek">
+              <p:cTn id="2" dur="indefinite" nodeType="mainSeq">
+                <p:childTnLst>
+                  <p:par>
+                    <p:cTn id="3" fill="hold">
+                      <p:stCondLst>
+                        <p:cond delay="indefinite"/>
+                      </p:stCondLst>
+                      <p:childTnLst>
+                        <p:par>
+                          <p:cTn id="4" fill="hold">
+                            <p:stCondLst>
+                              <p:cond delay="0"/>
+                            </p:stCondLst>
+                            <p:childTnLst>
+                              <p:par>
+                                <p:cTn id="5" presetID="10" presetClass="entr" presetSubtype="0" fill="hold" nodeType="clickEffect">
+                                  <p:stCondLst>
+                                    <p:cond delay="0"/>
+                                  </p:stCondLst>
+                                  <p:childTnLst>
+                                    <p:set>
+                                      <p:cBhvr>
+                                        <p:cTn id="6" dur="1" fill="hold">
+                                          <p:stCondLst>
+                                            <p:cond delay="0"/>
+                                          </p:stCondLst>
+                                        </p:cTn>
+                                        <p:tgtEl>
+                                          <p:spTgt spid="15"/>
+                                        </p:tgtEl>
+                                        <p:attrNameLst>
+                                          <p:attrName>style.visibility</p:attrName>
+                                        </p:attrNameLst>
+                                      </p:cBhvr>
+                                      <p:to>
+                                        <p:strVal val="visible"/>
+                                      </p:to>
+                                    </p:set>
+                                    <p:animEffect transition="in" filter="fade">
+                                      <p:cBhvr>
+                                        <p:cTn id="7" dur="500"/>
+                                        <p:tgtEl>
+                                          <p:spTgt spid="15"/>
+                                        </p:tgtEl>
+                                      </p:cBhvr>
+                                    </p:animEffect>
+                                  </p:childTnLst>
+                                </p:cTn>
+                              </p:par>
+                            </p:childTnLst>
+                          </p:cTn>
+                        </p:par>
+                      </p:childTnLst>
+                    </p:cTn>
+                  </p:par>
+                </p:childTnLst>
+              </p:cTn>
+              <p:prevCondLst>
+                <p:cond evt="onPrev" delay="0">
+                  <p:tgtEl>
+                    <p:sldTgt/>
+                  </p:tgtEl>
+                </p:cond>
+              </p:prevCondLst>
+              <p:nextCondLst>
+                <p:cond evt="onNext" delay="0">
+                  <p:tgtEl>
+                    <p:sldTgt/>
+                  </p:tgtEl>
+                </p:cond>
+              </p:nextCondLst>
+            </p:seq>
+          </p:childTnLst>
+        </p:cTn>
+      </p:par>
+    </p:tnLst>
+  </p:timing>
+</p:sld>
+</file>
+
+<file path=ppt/slides/slide9.xml><?xml version="1.0" encoding="utf-8"?>
+<p:sld xmlns:a="http://schemas.openxmlformats.org/drawingml/2006/main" xmlns:r="http://schemas.openxmlformats.org/officeDocument/2006/relationships" xmlns:p="http://schemas.openxmlformats.org/presentationml/2006/main">
+  <p:cSld>
+    <p:spTree>
+      <p:nvGrpSpPr>
+        <p:cNvPr id="1" name=""/>
+        <p:cNvGrpSpPr/>
+        <p:nvPr/>
+      </p:nvGrpSpPr>
+      <p:grpSpPr>
+        <a:xfrm>
+          <a:off x="0" y="0"/>
+          <a:ext cx="0" cy="0"/>
+          <a:chOff x="0" y="0"/>
+          <a:chExt cx="0" cy="0"/>
+        </a:xfrm>
+      </p:grpSpPr>
+      <p:sp>
+        <p:nvSpPr>
+          <p:cNvPr id="2" name="Title 1">
+            <a:extLst>
+              <a:ext uri="{FF2B5EF4-FFF2-40B4-BE49-F238E27FC236}">
+                <a16:creationId xmlns:a16="http://schemas.microsoft.com/office/drawing/2014/main" id="{16148562-5A2E-4189-9C70-89190A69B67D}"/>
+              </a:ext>
+            </a:extLst>
+          </p:cNvPr>
+          <p:cNvSpPr>
+            <a:spLocks noGrp="1"/>
+          </p:cNvSpPr>
+          <p:nvPr>
+            <p:ph type="title"/>
+          </p:nvPr>
+        </p:nvSpPr>
+        <p:spPr>
+          <a:xfrm>
+            <a:off x="962027" y="323850"/>
+            <a:ext cx="1917864" cy="895350"/>
+          </a:xfrm>
+        </p:spPr>
+        <p:txBody>
+          <a:bodyPr/>
+          <a:lstStyle/>
+          <a:p>
+            <a:r>
+              <a:rPr lang="en-IN" dirty="0"/>
+              <a:t>Circuit</a:t>
+            </a:r>
+          </a:p>
+        </p:txBody>
+      </p:sp>
+      <p:pic>
+        <p:nvPicPr>
+          <p:cNvPr id="10" name="Content Placeholder 9">
+            <a:extLst>
+              <a:ext uri="{FF2B5EF4-FFF2-40B4-BE49-F238E27FC236}">
+                <a16:creationId xmlns:a16="http://schemas.microsoft.com/office/drawing/2014/main" id="{6A35C7E8-5124-4951-98ED-00047CFCA047}"/>
+              </a:ext>
+            </a:extLst>
+          </p:cNvPr>
+          <p:cNvPicPr>
+            <a:picLocks noGrp="1" noChangeAspect="1"/>
+          </p:cNvPicPr>
+          <p:nvPr>
+            <p:ph idx="1"/>
+          </p:nvPr>
+        </p:nvPicPr>
+        <p:blipFill>
+          <a:blip r:embed="rId3"/>
+          <a:stretch>
+            <a:fillRect/>
+          </a:stretch>
+        </p:blipFill>
+        <p:spPr>
+          <a:xfrm>
+            <a:off x="2457559" y="1066251"/>
+            <a:ext cx="6467366" cy="4375164"/>
+          </a:xfrm>
+        </p:spPr>
+      </p:pic>
+    </p:spTree>
+    <p:custDataLst>
+      <p:tags r:id="rId1"/>
+    </p:custDataLst>
+    <p:extLst>
+      <p:ext uri="{BB962C8B-B14F-4D97-AF65-F5344CB8AC3E}">
+        <p14:creationId xmlns:p14="http://schemas.microsoft.com/office/powerpoint/2010/main" val="1988720397"/>
+      </p:ext>
+    </p:extLst>
+  </p:cSld>
+  <p:clrMapOvr>
+    <a:masterClrMapping/>
+  </p:clrMapOvr>
+</p:sld>
+</file>
+
+<file path=ppt/tags/tag1.xml><?xml version="1.0" encoding="utf-8"?>
+<p:tagLst xmlns:a="http://schemas.openxmlformats.org/drawingml/2006/main" xmlns:r="http://schemas.openxmlformats.org/officeDocument/2006/relationships" xmlns:p="http://schemas.openxmlformats.org/presentationml/2006/main">
+  <p:tag name="TIMING" val="|4.2|0.6|5|8|14"/>
+</p:tagLst>
+</file>
+
+<file path=ppt/tags/tag2.xml><?xml version="1.0" encoding="utf-8"?>
+<p:tagLst xmlns:a="http://schemas.openxmlformats.org/drawingml/2006/main" xmlns:r="http://schemas.openxmlformats.org/officeDocument/2006/relationships" xmlns:p="http://schemas.openxmlformats.org/presentationml/2006/main">
+  <p:tag name="TIMING" val="|1.6|1|4.4|2.9|13.8"/>
+</p:tagLst>
+</file>
+
+<file path=ppt/tags/tag3.xml><?xml version="1.0" encoding="utf-8"?>
+<p:tagLst xmlns:a="http://schemas.openxmlformats.org/drawingml/2006/main" xmlns:r="http://schemas.openxmlformats.org/officeDocument/2006/relationships" xmlns:p="http://schemas.openxmlformats.org/presentationml/2006/main">
+  <p:tag name="TIMING" val="|5.3|0.9|8.3|6.8|0.9"/>
+</p:tagLst>
+</file>
+
+<file path=ppt/tags/tag4.xml><?xml version="1.0" encoding="utf-8"?>
+<p:tagLst xmlns:a="http://schemas.openxmlformats.org/drawingml/2006/main" xmlns:r="http://schemas.openxmlformats.org/officeDocument/2006/relationships" xmlns:p="http://schemas.openxmlformats.org/presentationml/2006/main">
+  <p:tag name="TIMING" val="|1.5|0.7|1.6|26.6|0.4"/>
+</p:tagLst>
+</file>
+
+<file path=ppt/tags/tag5.xml><?xml version="1.0" encoding="utf-8"?>
+<p:tagLst xmlns:a="http://schemas.openxmlformats.org/drawingml/2006/main" xmlns:r="http://schemas.openxmlformats.org/officeDocument/2006/relationships" xmlns:p="http://schemas.openxmlformats.org/presentationml/2006/main">
+  <p:tag name="TIMING" val="|0.6|0.7|0.8|11.5|15.7|18.5"/>
+</p:tagLst>
+</file>
+
+<file path=ppt/tags/tag6.xml><?xml version="1.0" encoding="utf-8"?>
+<p:tagLst xmlns:a="http://schemas.openxmlformats.org/drawingml/2006/main" xmlns:r="http://schemas.openxmlformats.org/officeDocument/2006/relationships" xmlns:p="http://schemas.openxmlformats.org/presentationml/2006/main">
+  <p:tag name="TIMING" val="|0.8"/>
+</p:tagLst>
+</file>
+
+<file path=ppt/tags/tag7.xml><?xml version="1.0" encoding="utf-8"?>
+<p:tagLst xmlns:a="http://schemas.openxmlformats.org/drawingml/2006/main" xmlns:r="http://schemas.openxmlformats.org/officeDocument/2006/relationships" xmlns:p="http://schemas.openxmlformats.org/presentationml/2006/main">
+  <p:tag name="TIMING" val="|33|1.5"/>
+</p:tagLst>
+</file>
+
+<file path=ppt/tags/tag8.xml><?xml version="1.0" encoding="utf-8"?>
+<p:tagLst xmlns:a="http://schemas.openxmlformats.org/drawingml/2006/main" xmlns:r="http://schemas.openxmlformats.org/officeDocument/2006/relationships" xmlns:p="http://schemas.openxmlformats.org/presentationml/2006/main">
+  <p:tag name="TIMING" val="|1.1"/>
+</p:tagLst>
 </file>
 
 <file path=ppt/theme/theme1.xml><?xml version="1.0" encoding="utf-8"?>

</xml_diff>